<commit_message>
SQL testing: update slides - add DSN method for SAS and R
</commit_message>
<xml_diff>
--- a/testing/test_sql.pptx
+++ b/testing/test_sql.pptx
@@ -5,7 +5,7 @@
     <p:sldMasterId id="2147483648" r:id="rId1"/>
   </p:sldMasterIdLst>
   <p:notesMasterIdLst>
-    <p:notesMasterId r:id="rId12"/>
+    <p:notesMasterId r:id="rId20"/>
   </p:notesMasterIdLst>
   <p:sldIdLst>
     <p:sldId id="256" r:id="rId2"/>
@@ -13,11 +13,19 @@
     <p:sldId id="258" r:id="rId4"/>
     <p:sldId id="260" r:id="rId5"/>
     <p:sldId id="261" r:id="rId6"/>
-    <p:sldId id="262" r:id="rId7"/>
-    <p:sldId id="263" r:id="rId8"/>
-    <p:sldId id="266" r:id="rId9"/>
-    <p:sldId id="265" r:id="rId10"/>
-    <p:sldId id="267" r:id="rId11"/>
+    <p:sldId id="270" r:id="rId7"/>
+    <p:sldId id="265" r:id="rId8"/>
+    <p:sldId id="267" r:id="rId9"/>
+    <p:sldId id="269" r:id="rId10"/>
+    <p:sldId id="268" r:id="rId11"/>
+    <p:sldId id="272" r:id="rId12"/>
+    <p:sldId id="273" r:id="rId13"/>
+    <p:sldId id="274" r:id="rId14"/>
+    <p:sldId id="277" r:id="rId15"/>
+    <p:sldId id="275" r:id="rId16"/>
+    <p:sldId id="276" r:id="rId17"/>
+    <p:sldId id="263" r:id="rId18"/>
+    <p:sldId id="266" r:id="rId19"/>
   </p:sldIdLst>
   <p:sldSz cx="12192000" cy="6858000"/>
   <p:notesSz cx="6858000" cy="9144000"/>
@@ -116,6 +124,11 @@
       </a:defRPr>
     </a:lvl9pPr>
   </p:defaultTextStyle>
+  <p:extLst>
+    <p:ext uri="{EFAFB233-063F-42B5-8137-9DF3F51BA10A}">
+      <p15:sldGuideLst xmlns:p15="http://schemas.microsoft.com/office/powerpoint/2012/main"/>
+    </p:ext>
+  </p:extLst>
 </p:presentation>
 </file>
 
@@ -201,7 +214,7 @@
           <a:p>
             <a:fld id="{C82C5D2D-73FB-4054-908B-AB930B407DF2}" type="datetimeFigureOut">
               <a:rPr lang="en-US" smtClean="0"/>
-              <a:t>9/11/2025</a:t>
+              <a:t>9/24/2025</a:t>
             </a:fld>
             <a:endParaRPr lang="en-US"/>
           </a:p>
@@ -473,90 +486,6 @@
   <p:cSld>
     <p:spTree>
       <p:nvGrpSpPr>
-        <p:cNvPr id="1" name=""/>
-        <p:cNvGrpSpPr/>
-        <p:nvPr/>
-      </p:nvGrpSpPr>
-      <p:grpSpPr>
-        <a:xfrm>
-          <a:off x="0" y="0"/>
-          <a:ext cx="0" cy="0"/>
-          <a:chOff x="0" y="0"/>
-          <a:chExt cx="0" cy="0"/>
-        </a:xfrm>
-      </p:grpSpPr>
-      <p:sp>
-        <p:nvSpPr>
-          <p:cNvPr id="2" name="Slide Image Placeholder 1"/>
-          <p:cNvSpPr>
-            <a:spLocks noGrp="1" noRot="1" noChangeAspect="1"/>
-          </p:cNvSpPr>
-          <p:nvPr>
-            <p:ph type="sldImg"/>
-          </p:nvPr>
-        </p:nvSpPr>
-        <p:spPr/>
-      </p:sp>
-      <p:sp>
-        <p:nvSpPr>
-          <p:cNvPr id="3" name="Notes Placeholder 2"/>
-          <p:cNvSpPr>
-            <a:spLocks noGrp="1"/>
-          </p:cNvSpPr>
-          <p:nvPr>
-            <p:ph type="body" idx="1"/>
-          </p:nvPr>
-        </p:nvSpPr>
-        <p:spPr/>
-        <p:txBody>
-          <a:bodyPr/>
-          <a:lstStyle/>
-          <a:p>
-            <a:endParaRPr lang="en-US" dirty="0"/>
-          </a:p>
-        </p:txBody>
-      </p:sp>
-      <p:sp>
-        <p:nvSpPr>
-          <p:cNvPr id="4" name="Slide Number Placeholder 3"/>
-          <p:cNvSpPr>
-            <a:spLocks noGrp="1"/>
-          </p:cNvSpPr>
-          <p:nvPr>
-            <p:ph type="sldNum" sz="quarter" idx="5"/>
-          </p:nvPr>
-        </p:nvSpPr>
-        <p:spPr/>
-        <p:txBody>
-          <a:bodyPr/>
-          <a:lstStyle/>
-          <a:p>
-            <a:fld id="{089AB531-42DD-4E57-818C-9DC7517959CC}" type="slidenum">
-              <a:rPr lang="en-US" smtClean="0"/>
-              <a:t>7</a:t>
-            </a:fld>
-            <a:endParaRPr lang="en-US"/>
-          </a:p>
-        </p:txBody>
-      </p:sp>
-    </p:spTree>
-    <p:extLst>
-      <p:ext uri="{BB962C8B-B14F-4D97-AF65-F5344CB8AC3E}">
-        <p14:creationId xmlns:p14="http://schemas.microsoft.com/office/powerpoint/2010/main" val="1686338489"/>
-      </p:ext>
-    </p:extLst>
-  </p:cSld>
-  <p:clrMapOvr>
-    <a:masterClrMapping/>
-  </p:clrMapOvr>
-</p:notes>
-</file>
-
-<file path=ppt/notesSlides/notesSlide2.xml><?xml version="1.0" encoding="utf-8"?>
-<p:notes xmlns:a="http://schemas.openxmlformats.org/drawingml/2006/main" xmlns:r="http://schemas.openxmlformats.org/officeDocument/2006/relationships" xmlns:p="http://schemas.openxmlformats.org/presentationml/2006/main">
-  <p:cSld>
-    <p:spTree>
-      <p:nvGrpSpPr>
         <p:cNvPr id="1" name="">
           <a:extLst>
             <a:ext uri="{FF2B5EF4-FFF2-40B4-BE49-F238E27FC236}">
@@ -641,6 +570,114 @@
           <a:p>
             <a:fld id="{089AB531-42DD-4E57-818C-9DC7517959CC}" type="slidenum">
               <a:rPr lang="en-US" smtClean="0"/>
+              <a:t>7</a:t>
+            </a:fld>
+            <a:endParaRPr lang="en-US"/>
+          </a:p>
+        </p:txBody>
+      </p:sp>
+    </p:spTree>
+    <p:extLst>
+      <p:ext uri="{BB962C8B-B14F-4D97-AF65-F5344CB8AC3E}">
+        <p14:creationId xmlns:p14="http://schemas.microsoft.com/office/powerpoint/2010/main" val="2796234034"/>
+      </p:ext>
+    </p:extLst>
+  </p:cSld>
+  <p:clrMapOvr>
+    <a:masterClrMapping/>
+  </p:clrMapOvr>
+</p:notes>
+</file>
+
+<file path=ppt/notesSlides/notesSlide2.xml><?xml version="1.0" encoding="utf-8"?>
+<p:notes xmlns:a="http://schemas.openxmlformats.org/drawingml/2006/main" xmlns:r="http://schemas.openxmlformats.org/officeDocument/2006/relationships" xmlns:p="http://schemas.openxmlformats.org/presentationml/2006/main">
+  <p:cSld>
+    <p:spTree>
+      <p:nvGrpSpPr>
+        <p:cNvPr id="1" name="">
+          <a:extLst>
+            <a:ext uri="{FF2B5EF4-FFF2-40B4-BE49-F238E27FC236}">
+              <a16:creationId xmlns:a16="http://schemas.microsoft.com/office/drawing/2014/main" id="{EE0A19B4-B997-59A2-B87E-014DAA487B47}"/>
+            </a:ext>
+          </a:extLst>
+        </p:cNvPr>
+        <p:cNvGrpSpPr/>
+        <p:nvPr/>
+      </p:nvGrpSpPr>
+      <p:grpSpPr>
+        <a:xfrm>
+          <a:off x="0" y="0"/>
+          <a:ext cx="0" cy="0"/>
+          <a:chOff x="0" y="0"/>
+          <a:chExt cx="0" cy="0"/>
+        </a:xfrm>
+      </p:grpSpPr>
+      <p:sp>
+        <p:nvSpPr>
+          <p:cNvPr id="2" name="Slide Image Placeholder 1">
+            <a:extLst>
+              <a:ext uri="{FF2B5EF4-FFF2-40B4-BE49-F238E27FC236}">
+                <a16:creationId xmlns:a16="http://schemas.microsoft.com/office/drawing/2014/main" id="{47EE0BD4-7674-06F2-4080-E79660255676}"/>
+              </a:ext>
+            </a:extLst>
+          </p:cNvPr>
+          <p:cNvSpPr>
+            <a:spLocks noGrp="1" noRot="1" noChangeAspect="1"/>
+          </p:cNvSpPr>
+          <p:nvPr>
+            <p:ph type="sldImg"/>
+          </p:nvPr>
+        </p:nvSpPr>
+        <p:spPr/>
+      </p:sp>
+      <p:sp>
+        <p:nvSpPr>
+          <p:cNvPr id="3" name="Notes Placeholder 2">
+            <a:extLst>
+              <a:ext uri="{FF2B5EF4-FFF2-40B4-BE49-F238E27FC236}">
+                <a16:creationId xmlns:a16="http://schemas.microsoft.com/office/drawing/2014/main" id="{CBC5EDE0-D239-4BAF-65FD-91A2B259EB20}"/>
+              </a:ext>
+            </a:extLst>
+          </p:cNvPr>
+          <p:cNvSpPr>
+            <a:spLocks noGrp="1"/>
+          </p:cNvSpPr>
+          <p:nvPr>
+            <p:ph type="body" idx="1"/>
+          </p:nvPr>
+        </p:nvSpPr>
+        <p:spPr/>
+        <p:txBody>
+          <a:bodyPr/>
+          <a:lstStyle/>
+          <a:p>
+            <a:endParaRPr lang="en-US" dirty="0"/>
+          </a:p>
+        </p:txBody>
+      </p:sp>
+      <p:sp>
+        <p:nvSpPr>
+          <p:cNvPr id="4" name="Slide Number Placeholder 3">
+            <a:extLst>
+              <a:ext uri="{FF2B5EF4-FFF2-40B4-BE49-F238E27FC236}">
+                <a16:creationId xmlns:a16="http://schemas.microsoft.com/office/drawing/2014/main" id="{8B8B38DF-09B0-1EE7-7D90-9A3E327573E3}"/>
+              </a:ext>
+            </a:extLst>
+          </p:cNvPr>
+          <p:cNvSpPr>
+            <a:spLocks noGrp="1"/>
+          </p:cNvSpPr>
+          <p:nvPr>
+            <p:ph type="sldNum" sz="quarter" idx="5"/>
+          </p:nvPr>
+        </p:nvSpPr>
+        <p:spPr/>
+        <p:txBody>
+          <a:bodyPr/>
+          <a:lstStyle/>
+          <a:p>
+            <a:fld id="{089AB531-42DD-4E57-818C-9DC7517959CC}" type="slidenum">
+              <a:rPr lang="en-US" smtClean="0"/>
               <a:t>9</a:t>
             </a:fld>
             <a:endParaRPr lang="en-US"/>
@@ -650,7 +687,739 @@
     </p:spTree>
     <p:extLst>
       <p:ext uri="{BB962C8B-B14F-4D97-AF65-F5344CB8AC3E}">
-        <p14:creationId xmlns:p14="http://schemas.microsoft.com/office/powerpoint/2010/main" val="1721047853"/>
+        <p14:creationId xmlns:p14="http://schemas.microsoft.com/office/powerpoint/2010/main" val="2698285958"/>
+      </p:ext>
+    </p:extLst>
+  </p:cSld>
+  <p:clrMapOvr>
+    <a:masterClrMapping/>
+  </p:clrMapOvr>
+</p:notes>
+</file>
+
+<file path=ppt/notesSlides/notesSlide3.xml><?xml version="1.0" encoding="utf-8"?>
+<p:notes xmlns:a="http://schemas.openxmlformats.org/drawingml/2006/main" xmlns:r="http://schemas.openxmlformats.org/officeDocument/2006/relationships" xmlns:p="http://schemas.openxmlformats.org/presentationml/2006/main">
+  <p:cSld>
+    <p:spTree>
+      <p:nvGrpSpPr>
+        <p:cNvPr id="1" name="">
+          <a:extLst>
+            <a:ext uri="{FF2B5EF4-FFF2-40B4-BE49-F238E27FC236}">
+              <a16:creationId xmlns:a16="http://schemas.microsoft.com/office/drawing/2014/main" id="{86FD05A0-D9E7-7F85-F42E-42A50A9E5996}"/>
+            </a:ext>
+          </a:extLst>
+        </p:cNvPr>
+        <p:cNvGrpSpPr/>
+        <p:nvPr/>
+      </p:nvGrpSpPr>
+      <p:grpSpPr>
+        <a:xfrm>
+          <a:off x="0" y="0"/>
+          <a:ext cx="0" cy="0"/>
+          <a:chOff x="0" y="0"/>
+          <a:chExt cx="0" cy="0"/>
+        </a:xfrm>
+      </p:grpSpPr>
+      <p:sp>
+        <p:nvSpPr>
+          <p:cNvPr id="2" name="Slide Image Placeholder 1">
+            <a:extLst>
+              <a:ext uri="{FF2B5EF4-FFF2-40B4-BE49-F238E27FC236}">
+                <a16:creationId xmlns:a16="http://schemas.microsoft.com/office/drawing/2014/main" id="{129DB563-F4A2-24A6-752D-A83581C8EAAA}"/>
+              </a:ext>
+            </a:extLst>
+          </p:cNvPr>
+          <p:cNvSpPr>
+            <a:spLocks noGrp="1" noRot="1" noChangeAspect="1"/>
+          </p:cNvSpPr>
+          <p:nvPr>
+            <p:ph type="sldImg"/>
+          </p:nvPr>
+        </p:nvSpPr>
+        <p:spPr/>
+      </p:sp>
+      <p:sp>
+        <p:nvSpPr>
+          <p:cNvPr id="3" name="Notes Placeholder 2">
+            <a:extLst>
+              <a:ext uri="{FF2B5EF4-FFF2-40B4-BE49-F238E27FC236}">
+                <a16:creationId xmlns:a16="http://schemas.microsoft.com/office/drawing/2014/main" id="{46DA8CCF-17DB-4302-C5F6-677DDA38E586}"/>
+              </a:ext>
+            </a:extLst>
+          </p:cNvPr>
+          <p:cNvSpPr>
+            <a:spLocks noGrp="1"/>
+          </p:cNvSpPr>
+          <p:nvPr>
+            <p:ph type="body" idx="1"/>
+          </p:nvPr>
+        </p:nvSpPr>
+        <p:spPr/>
+        <p:txBody>
+          <a:bodyPr/>
+          <a:lstStyle/>
+          <a:p>
+            <a:endParaRPr lang="en-US" dirty="0"/>
+          </a:p>
+        </p:txBody>
+      </p:sp>
+      <p:sp>
+        <p:nvSpPr>
+          <p:cNvPr id="4" name="Slide Number Placeholder 3">
+            <a:extLst>
+              <a:ext uri="{FF2B5EF4-FFF2-40B4-BE49-F238E27FC236}">
+                <a16:creationId xmlns:a16="http://schemas.microsoft.com/office/drawing/2014/main" id="{09DECE8C-6651-A943-7AC2-9BE34667D7DA}"/>
+              </a:ext>
+            </a:extLst>
+          </p:cNvPr>
+          <p:cNvSpPr>
+            <a:spLocks noGrp="1"/>
+          </p:cNvSpPr>
+          <p:nvPr>
+            <p:ph type="sldNum" sz="quarter" idx="5"/>
+          </p:nvPr>
+        </p:nvSpPr>
+        <p:spPr/>
+        <p:txBody>
+          <a:bodyPr/>
+          <a:lstStyle/>
+          <a:p>
+            <a:fld id="{089AB531-42DD-4E57-818C-9DC7517959CC}" type="slidenum">
+              <a:rPr lang="en-US" smtClean="0"/>
+              <a:t>11</a:t>
+            </a:fld>
+            <a:endParaRPr lang="en-US"/>
+          </a:p>
+        </p:txBody>
+      </p:sp>
+    </p:spTree>
+    <p:extLst>
+      <p:ext uri="{BB962C8B-B14F-4D97-AF65-F5344CB8AC3E}">
+        <p14:creationId xmlns:p14="http://schemas.microsoft.com/office/powerpoint/2010/main" val="3313730067"/>
+      </p:ext>
+    </p:extLst>
+  </p:cSld>
+  <p:clrMapOvr>
+    <a:masterClrMapping/>
+  </p:clrMapOvr>
+</p:notes>
+</file>
+
+<file path=ppt/notesSlides/notesSlide4.xml><?xml version="1.0" encoding="utf-8"?>
+<p:notes xmlns:a="http://schemas.openxmlformats.org/drawingml/2006/main" xmlns:r="http://schemas.openxmlformats.org/officeDocument/2006/relationships" xmlns:p="http://schemas.openxmlformats.org/presentationml/2006/main">
+  <p:cSld>
+    <p:spTree>
+      <p:nvGrpSpPr>
+        <p:cNvPr id="1" name="">
+          <a:extLst>
+            <a:ext uri="{FF2B5EF4-FFF2-40B4-BE49-F238E27FC236}">
+              <a16:creationId xmlns:a16="http://schemas.microsoft.com/office/drawing/2014/main" id="{98ABFC00-68A1-CD63-5401-2891BB0A54D9}"/>
+            </a:ext>
+          </a:extLst>
+        </p:cNvPr>
+        <p:cNvGrpSpPr/>
+        <p:nvPr/>
+      </p:nvGrpSpPr>
+      <p:grpSpPr>
+        <a:xfrm>
+          <a:off x="0" y="0"/>
+          <a:ext cx="0" cy="0"/>
+          <a:chOff x="0" y="0"/>
+          <a:chExt cx="0" cy="0"/>
+        </a:xfrm>
+      </p:grpSpPr>
+      <p:sp>
+        <p:nvSpPr>
+          <p:cNvPr id="2" name="Slide Image Placeholder 1">
+            <a:extLst>
+              <a:ext uri="{FF2B5EF4-FFF2-40B4-BE49-F238E27FC236}">
+                <a16:creationId xmlns:a16="http://schemas.microsoft.com/office/drawing/2014/main" id="{A8D5C800-F277-2A74-C42E-A68987F6EFDB}"/>
+              </a:ext>
+            </a:extLst>
+          </p:cNvPr>
+          <p:cNvSpPr>
+            <a:spLocks noGrp="1" noRot="1" noChangeAspect="1"/>
+          </p:cNvSpPr>
+          <p:nvPr>
+            <p:ph type="sldImg"/>
+          </p:nvPr>
+        </p:nvSpPr>
+        <p:spPr/>
+      </p:sp>
+      <p:sp>
+        <p:nvSpPr>
+          <p:cNvPr id="3" name="Notes Placeholder 2">
+            <a:extLst>
+              <a:ext uri="{FF2B5EF4-FFF2-40B4-BE49-F238E27FC236}">
+                <a16:creationId xmlns:a16="http://schemas.microsoft.com/office/drawing/2014/main" id="{C4A8A030-EC9D-A2F8-6E3A-E7E9A6942DD7}"/>
+              </a:ext>
+            </a:extLst>
+          </p:cNvPr>
+          <p:cNvSpPr>
+            <a:spLocks noGrp="1"/>
+          </p:cNvSpPr>
+          <p:nvPr>
+            <p:ph type="body" idx="1"/>
+          </p:nvPr>
+        </p:nvSpPr>
+        <p:spPr/>
+        <p:txBody>
+          <a:bodyPr/>
+          <a:lstStyle/>
+          <a:p>
+            <a:endParaRPr lang="en-US" dirty="0"/>
+          </a:p>
+        </p:txBody>
+      </p:sp>
+      <p:sp>
+        <p:nvSpPr>
+          <p:cNvPr id="4" name="Slide Number Placeholder 3">
+            <a:extLst>
+              <a:ext uri="{FF2B5EF4-FFF2-40B4-BE49-F238E27FC236}">
+                <a16:creationId xmlns:a16="http://schemas.microsoft.com/office/drawing/2014/main" id="{05555C80-D44A-8DBE-9C96-8E86E2AEC561}"/>
+              </a:ext>
+            </a:extLst>
+          </p:cNvPr>
+          <p:cNvSpPr>
+            <a:spLocks noGrp="1"/>
+          </p:cNvSpPr>
+          <p:nvPr>
+            <p:ph type="sldNum" sz="quarter" idx="5"/>
+          </p:nvPr>
+        </p:nvSpPr>
+        <p:spPr/>
+        <p:txBody>
+          <a:bodyPr/>
+          <a:lstStyle/>
+          <a:p>
+            <a:fld id="{089AB531-42DD-4E57-818C-9DC7517959CC}" type="slidenum">
+              <a:rPr lang="en-US" smtClean="0"/>
+              <a:t>12</a:t>
+            </a:fld>
+            <a:endParaRPr lang="en-US"/>
+          </a:p>
+        </p:txBody>
+      </p:sp>
+    </p:spTree>
+    <p:extLst>
+      <p:ext uri="{BB962C8B-B14F-4D97-AF65-F5344CB8AC3E}">
+        <p14:creationId xmlns:p14="http://schemas.microsoft.com/office/powerpoint/2010/main" val="2243974179"/>
+      </p:ext>
+    </p:extLst>
+  </p:cSld>
+  <p:clrMapOvr>
+    <a:masterClrMapping/>
+  </p:clrMapOvr>
+</p:notes>
+</file>
+
+<file path=ppt/notesSlides/notesSlide5.xml><?xml version="1.0" encoding="utf-8"?>
+<p:notes xmlns:a="http://schemas.openxmlformats.org/drawingml/2006/main" xmlns:r="http://schemas.openxmlformats.org/officeDocument/2006/relationships" xmlns:p="http://schemas.openxmlformats.org/presentationml/2006/main">
+  <p:cSld>
+    <p:spTree>
+      <p:nvGrpSpPr>
+        <p:cNvPr id="1" name="">
+          <a:extLst>
+            <a:ext uri="{FF2B5EF4-FFF2-40B4-BE49-F238E27FC236}">
+              <a16:creationId xmlns:a16="http://schemas.microsoft.com/office/drawing/2014/main" id="{EB097A66-E2B5-6B8C-0656-D9C5C43A5EC1}"/>
+            </a:ext>
+          </a:extLst>
+        </p:cNvPr>
+        <p:cNvGrpSpPr/>
+        <p:nvPr/>
+      </p:nvGrpSpPr>
+      <p:grpSpPr>
+        <a:xfrm>
+          <a:off x="0" y="0"/>
+          <a:ext cx="0" cy="0"/>
+          <a:chOff x="0" y="0"/>
+          <a:chExt cx="0" cy="0"/>
+        </a:xfrm>
+      </p:grpSpPr>
+      <p:sp>
+        <p:nvSpPr>
+          <p:cNvPr id="2" name="Slide Image Placeholder 1">
+            <a:extLst>
+              <a:ext uri="{FF2B5EF4-FFF2-40B4-BE49-F238E27FC236}">
+                <a16:creationId xmlns:a16="http://schemas.microsoft.com/office/drawing/2014/main" id="{5F00AC15-F190-3695-D737-E63B983266FE}"/>
+              </a:ext>
+            </a:extLst>
+          </p:cNvPr>
+          <p:cNvSpPr>
+            <a:spLocks noGrp="1" noRot="1" noChangeAspect="1"/>
+          </p:cNvSpPr>
+          <p:nvPr>
+            <p:ph type="sldImg"/>
+          </p:nvPr>
+        </p:nvSpPr>
+        <p:spPr/>
+      </p:sp>
+      <p:sp>
+        <p:nvSpPr>
+          <p:cNvPr id="3" name="Notes Placeholder 2">
+            <a:extLst>
+              <a:ext uri="{FF2B5EF4-FFF2-40B4-BE49-F238E27FC236}">
+                <a16:creationId xmlns:a16="http://schemas.microsoft.com/office/drawing/2014/main" id="{A33776A3-8F27-23D4-99BE-CF8D03FC92CC}"/>
+              </a:ext>
+            </a:extLst>
+          </p:cNvPr>
+          <p:cNvSpPr>
+            <a:spLocks noGrp="1"/>
+          </p:cNvSpPr>
+          <p:nvPr>
+            <p:ph type="body" idx="1"/>
+          </p:nvPr>
+        </p:nvSpPr>
+        <p:spPr/>
+        <p:txBody>
+          <a:bodyPr/>
+          <a:lstStyle/>
+          <a:p>
+            <a:endParaRPr lang="en-US" dirty="0"/>
+          </a:p>
+        </p:txBody>
+      </p:sp>
+      <p:sp>
+        <p:nvSpPr>
+          <p:cNvPr id="4" name="Slide Number Placeholder 3">
+            <a:extLst>
+              <a:ext uri="{FF2B5EF4-FFF2-40B4-BE49-F238E27FC236}">
+                <a16:creationId xmlns:a16="http://schemas.microsoft.com/office/drawing/2014/main" id="{410E992C-E0AE-0A63-4DBA-095EA91EAD52}"/>
+              </a:ext>
+            </a:extLst>
+          </p:cNvPr>
+          <p:cNvSpPr>
+            <a:spLocks noGrp="1"/>
+          </p:cNvSpPr>
+          <p:nvPr>
+            <p:ph type="sldNum" sz="quarter" idx="5"/>
+          </p:nvPr>
+        </p:nvSpPr>
+        <p:spPr/>
+        <p:txBody>
+          <a:bodyPr/>
+          <a:lstStyle/>
+          <a:p>
+            <a:fld id="{089AB531-42DD-4E57-818C-9DC7517959CC}" type="slidenum">
+              <a:rPr lang="en-US" smtClean="0"/>
+              <a:t>13</a:t>
+            </a:fld>
+            <a:endParaRPr lang="en-US"/>
+          </a:p>
+        </p:txBody>
+      </p:sp>
+    </p:spTree>
+    <p:extLst>
+      <p:ext uri="{BB962C8B-B14F-4D97-AF65-F5344CB8AC3E}">
+        <p14:creationId xmlns:p14="http://schemas.microsoft.com/office/powerpoint/2010/main" val="3248054941"/>
+      </p:ext>
+    </p:extLst>
+  </p:cSld>
+  <p:clrMapOvr>
+    <a:masterClrMapping/>
+  </p:clrMapOvr>
+</p:notes>
+</file>
+
+<file path=ppt/notesSlides/notesSlide6.xml><?xml version="1.0" encoding="utf-8"?>
+<p:notes xmlns:a="http://schemas.openxmlformats.org/drawingml/2006/main" xmlns:r="http://schemas.openxmlformats.org/officeDocument/2006/relationships" xmlns:p="http://schemas.openxmlformats.org/presentationml/2006/main">
+  <p:cSld>
+    <p:spTree>
+      <p:nvGrpSpPr>
+        <p:cNvPr id="1" name="">
+          <a:extLst>
+            <a:ext uri="{FF2B5EF4-FFF2-40B4-BE49-F238E27FC236}">
+              <a16:creationId xmlns:a16="http://schemas.microsoft.com/office/drawing/2014/main" id="{5896DAC0-E789-B3BF-B5D2-5B31B7A62DD3}"/>
+            </a:ext>
+          </a:extLst>
+        </p:cNvPr>
+        <p:cNvGrpSpPr/>
+        <p:nvPr/>
+      </p:nvGrpSpPr>
+      <p:grpSpPr>
+        <a:xfrm>
+          <a:off x="0" y="0"/>
+          <a:ext cx="0" cy="0"/>
+          <a:chOff x="0" y="0"/>
+          <a:chExt cx="0" cy="0"/>
+        </a:xfrm>
+      </p:grpSpPr>
+      <p:sp>
+        <p:nvSpPr>
+          <p:cNvPr id="2" name="Slide Image Placeholder 1">
+            <a:extLst>
+              <a:ext uri="{FF2B5EF4-FFF2-40B4-BE49-F238E27FC236}">
+                <a16:creationId xmlns:a16="http://schemas.microsoft.com/office/drawing/2014/main" id="{FBF1A6D3-B596-57FB-76F1-17D4C51A8312}"/>
+              </a:ext>
+            </a:extLst>
+          </p:cNvPr>
+          <p:cNvSpPr>
+            <a:spLocks noGrp="1" noRot="1" noChangeAspect="1"/>
+          </p:cNvSpPr>
+          <p:nvPr>
+            <p:ph type="sldImg"/>
+          </p:nvPr>
+        </p:nvSpPr>
+        <p:spPr/>
+      </p:sp>
+      <p:sp>
+        <p:nvSpPr>
+          <p:cNvPr id="3" name="Notes Placeholder 2">
+            <a:extLst>
+              <a:ext uri="{FF2B5EF4-FFF2-40B4-BE49-F238E27FC236}">
+                <a16:creationId xmlns:a16="http://schemas.microsoft.com/office/drawing/2014/main" id="{74CD4480-0B88-8402-B1B8-B4AD0F0C9FF2}"/>
+              </a:ext>
+            </a:extLst>
+          </p:cNvPr>
+          <p:cNvSpPr>
+            <a:spLocks noGrp="1"/>
+          </p:cNvSpPr>
+          <p:nvPr>
+            <p:ph type="body" idx="1"/>
+          </p:nvPr>
+        </p:nvSpPr>
+        <p:spPr/>
+        <p:txBody>
+          <a:bodyPr/>
+          <a:lstStyle/>
+          <a:p>
+            <a:endParaRPr lang="en-US" dirty="0"/>
+          </a:p>
+        </p:txBody>
+      </p:sp>
+      <p:sp>
+        <p:nvSpPr>
+          <p:cNvPr id="4" name="Slide Number Placeholder 3">
+            <a:extLst>
+              <a:ext uri="{FF2B5EF4-FFF2-40B4-BE49-F238E27FC236}">
+                <a16:creationId xmlns:a16="http://schemas.microsoft.com/office/drawing/2014/main" id="{C499A55F-6E21-D5BF-408F-C4D0E2184293}"/>
+              </a:ext>
+            </a:extLst>
+          </p:cNvPr>
+          <p:cNvSpPr>
+            <a:spLocks noGrp="1"/>
+          </p:cNvSpPr>
+          <p:nvPr>
+            <p:ph type="sldNum" sz="quarter" idx="5"/>
+          </p:nvPr>
+        </p:nvSpPr>
+        <p:spPr/>
+        <p:txBody>
+          <a:bodyPr/>
+          <a:lstStyle/>
+          <a:p>
+            <a:fld id="{089AB531-42DD-4E57-818C-9DC7517959CC}" type="slidenum">
+              <a:rPr lang="en-US" smtClean="0"/>
+              <a:t>14</a:t>
+            </a:fld>
+            <a:endParaRPr lang="en-US"/>
+          </a:p>
+        </p:txBody>
+      </p:sp>
+    </p:spTree>
+    <p:extLst>
+      <p:ext uri="{BB962C8B-B14F-4D97-AF65-F5344CB8AC3E}">
+        <p14:creationId xmlns:p14="http://schemas.microsoft.com/office/powerpoint/2010/main" val="73181883"/>
+      </p:ext>
+    </p:extLst>
+  </p:cSld>
+  <p:clrMapOvr>
+    <a:masterClrMapping/>
+  </p:clrMapOvr>
+</p:notes>
+</file>
+
+<file path=ppt/notesSlides/notesSlide7.xml><?xml version="1.0" encoding="utf-8"?>
+<p:notes xmlns:a="http://schemas.openxmlformats.org/drawingml/2006/main" xmlns:r="http://schemas.openxmlformats.org/officeDocument/2006/relationships" xmlns:p="http://schemas.openxmlformats.org/presentationml/2006/main">
+  <p:cSld>
+    <p:spTree>
+      <p:nvGrpSpPr>
+        <p:cNvPr id="1" name="">
+          <a:extLst>
+            <a:ext uri="{FF2B5EF4-FFF2-40B4-BE49-F238E27FC236}">
+              <a16:creationId xmlns:a16="http://schemas.microsoft.com/office/drawing/2014/main" id="{3C446714-9BC3-639E-9528-3D9D2CD8E71C}"/>
+            </a:ext>
+          </a:extLst>
+        </p:cNvPr>
+        <p:cNvGrpSpPr/>
+        <p:nvPr/>
+      </p:nvGrpSpPr>
+      <p:grpSpPr>
+        <a:xfrm>
+          <a:off x="0" y="0"/>
+          <a:ext cx="0" cy="0"/>
+          <a:chOff x="0" y="0"/>
+          <a:chExt cx="0" cy="0"/>
+        </a:xfrm>
+      </p:grpSpPr>
+      <p:sp>
+        <p:nvSpPr>
+          <p:cNvPr id="2" name="Slide Image Placeholder 1">
+            <a:extLst>
+              <a:ext uri="{FF2B5EF4-FFF2-40B4-BE49-F238E27FC236}">
+                <a16:creationId xmlns:a16="http://schemas.microsoft.com/office/drawing/2014/main" id="{AF90321E-267E-D9D7-68BD-B054397643E2}"/>
+              </a:ext>
+            </a:extLst>
+          </p:cNvPr>
+          <p:cNvSpPr>
+            <a:spLocks noGrp="1" noRot="1" noChangeAspect="1"/>
+          </p:cNvSpPr>
+          <p:nvPr>
+            <p:ph type="sldImg"/>
+          </p:nvPr>
+        </p:nvSpPr>
+        <p:spPr/>
+      </p:sp>
+      <p:sp>
+        <p:nvSpPr>
+          <p:cNvPr id="3" name="Notes Placeholder 2">
+            <a:extLst>
+              <a:ext uri="{FF2B5EF4-FFF2-40B4-BE49-F238E27FC236}">
+                <a16:creationId xmlns:a16="http://schemas.microsoft.com/office/drawing/2014/main" id="{36AA2E57-BD30-FC80-6F31-78490C77967F}"/>
+              </a:ext>
+            </a:extLst>
+          </p:cNvPr>
+          <p:cNvSpPr>
+            <a:spLocks noGrp="1"/>
+          </p:cNvSpPr>
+          <p:nvPr>
+            <p:ph type="body" idx="1"/>
+          </p:nvPr>
+        </p:nvSpPr>
+        <p:spPr/>
+        <p:txBody>
+          <a:bodyPr/>
+          <a:lstStyle/>
+          <a:p>
+            <a:endParaRPr lang="en-US" dirty="0"/>
+          </a:p>
+        </p:txBody>
+      </p:sp>
+      <p:sp>
+        <p:nvSpPr>
+          <p:cNvPr id="4" name="Slide Number Placeholder 3">
+            <a:extLst>
+              <a:ext uri="{FF2B5EF4-FFF2-40B4-BE49-F238E27FC236}">
+                <a16:creationId xmlns:a16="http://schemas.microsoft.com/office/drawing/2014/main" id="{ECA394F2-7765-17D6-86BA-301877468346}"/>
+              </a:ext>
+            </a:extLst>
+          </p:cNvPr>
+          <p:cNvSpPr>
+            <a:spLocks noGrp="1"/>
+          </p:cNvSpPr>
+          <p:nvPr>
+            <p:ph type="sldNum" sz="quarter" idx="5"/>
+          </p:nvPr>
+        </p:nvSpPr>
+        <p:spPr/>
+        <p:txBody>
+          <a:bodyPr/>
+          <a:lstStyle/>
+          <a:p>
+            <a:fld id="{089AB531-42DD-4E57-818C-9DC7517959CC}" type="slidenum">
+              <a:rPr lang="en-US" smtClean="0"/>
+              <a:t>15</a:t>
+            </a:fld>
+            <a:endParaRPr lang="en-US"/>
+          </a:p>
+        </p:txBody>
+      </p:sp>
+    </p:spTree>
+    <p:extLst>
+      <p:ext uri="{BB962C8B-B14F-4D97-AF65-F5344CB8AC3E}">
+        <p14:creationId xmlns:p14="http://schemas.microsoft.com/office/powerpoint/2010/main" val="1303046507"/>
+      </p:ext>
+    </p:extLst>
+  </p:cSld>
+  <p:clrMapOvr>
+    <a:masterClrMapping/>
+  </p:clrMapOvr>
+</p:notes>
+</file>
+
+<file path=ppt/notesSlides/notesSlide8.xml><?xml version="1.0" encoding="utf-8"?>
+<p:notes xmlns:a="http://schemas.openxmlformats.org/drawingml/2006/main" xmlns:r="http://schemas.openxmlformats.org/officeDocument/2006/relationships" xmlns:p="http://schemas.openxmlformats.org/presentationml/2006/main">
+  <p:cSld>
+    <p:spTree>
+      <p:nvGrpSpPr>
+        <p:cNvPr id="1" name="">
+          <a:extLst>
+            <a:ext uri="{FF2B5EF4-FFF2-40B4-BE49-F238E27FC236}">
+              <a16:creationId xmlns:a16="http://schemas.microsoft.com/office/drawing/2014/main" id="{684CC92A-5D31-044F-FDD9-C3AF9C5884D4}"/>
+            </a:ext>
+          </a:extLst>
+        </p:cNvPr>
+        <p:cNvGrpSpPr/>
+        <p:nvPr/>
+      </p:nvGrpSpPr>
+      <p:grpSpPr>
+        <a:xfrm>
+          <a:off x="0" y="0"/>
+          <a:ext cx="0" cy="0"/>
+          <a:chOff x="0" y="0"/>
+          <a:chExt cx="0" cy="0"/>
+        </a:xfrm>
+      </p:grpSpPr>
+      <p:sp>
+        <p:nvSpPr>
+          <p:cNvPr id="2" name="Slide Image Placeholder 1">
+            <a:extLst>
+              <a:ext uri="{FF2B5EF4-FFF2-40B4-BE49-F238E27FC236}">
+                <a16:creationId xmlns:a16="http://schemas.microsoft.com/office/drawing/2014/main" id="{D7734EEA-8BBF-11F0-DD47-52C3676C06A3}"/>
+              </a:ext>
+            </a:extLst>
+          </p:cNvPr>
+          <p:cNvSpPr>
+            <a:spLocks noGrp="1" noRot="1" noChangeAspect="1"/>
+          </p:cNvSpPr>
+          <p:nvPr>
+            <p:ph type="sldImg"/>
+          </p:nvPr>
+        </p:nvSpPr>
+        <p:spPr/>
+      </p:sp>
+      <p:sp>
+        <p:nvSpPr>
+          <p:cNvPr id="3" name="Notes Placeholder 2">
+            <a:extLst>
+              <a:ext uri="{FF2B5EF4-FFF2-40B4-BE49-F238E27FC236}">
+                <a16:creationId xmlns:a16="http://schemas.microsoft.com/office/drawing/2014/main" id="{75583E62-BDE8-D09B-F3D6-BAD21D4CD351}"/>
+              </a:ext>
+            </a:extLst>
+          </p:cNvPr>
+          <p:cNvSpPr>
+            <a:spLocks noGrp="1"/>
+          </p:cNvSpPr>
+          <p:nvPr>
+            <p:ph type="body" idx="1"/>
+          </p:nvPr>
+        </p:nvSpPr>
+        <p:spPr/>
+        <p:txBody>
+          <a:bodyPr/>
+          <a:lstStyle/>
+          <a:p>
+            <a:endParaRPr lang="en-US" dirty="0"/>
+          </a:p>
+        </p:txBody>
+      </p:sp>
+      <p:sp>
+        <p:nvSpPr>
+          <p:cNvPr id="4" name="Slide Number Placeholder 3">
+            <a:extLst>
+              <a:ext uri="{FF2B5EF4-FFF2-40B4-BE49-F238E27FC236}">
+                <a16:creationId xmlns:a16="http://schemas.microsoft.com/office/drawing/2014/main" id="{959A363A-2365-BCE8-24C2-92953C2E94E7}"/>
+              </a:ext>
+            </a:extLst>
+          </p:cNvPr>
+          <p:cNvSpPr>
+            <a:spLocks noGrp="1"/>
+          </p:cNvSpPr>
+          <p:nvPr>
+            <p:ph type="sldNum" sz="quarter" idx="5"/>
+          </p:nvPr>
+        </p:nvSpPr>
+        <p:spPr/>
+        <p:txBody>
+          <a:bodyPr/>
+          <a:lstStyle/>
+          <a:p>
+            <a:fld id="{089AB531-42DD-4E57-818C-9DC7517959CC}" type="slidenum">
+              <a:rPr lang="en-US" smtClean="0"/>
+              <a:t>16</a:t>
+            </a:fld>
+            <a:endParaRPr lang="en-US"/>
+          </a:p>
+        </p:txBody>
+      </p:sp>
+    </p:spTree>
+    <p:extLst>
+      <p:ext uri="{BB962C8B-B14F-4D97-AF65-F5344CB8AC3E}">
+        <p14:creationId xmlns:p14="http://schemas.microsoft.com/office/powerpoint/2010/main" val="872106457"/>
+      </p:ext>
+    </p:extLst>
+  </p:cSld>
+  <p:clrMapOvr>
+    <a:masterClrMapping/>
+  </p:clrMapOvr>
+</p:notes>
+</file>
+
+<file path=ppt/notesSlides/notesSlide9.xml><?xml version="1.0" encoding="utf-8"?>
+<p:notes xmlns:a="http://schemas.openxmlformats.org/drawingml/2006/main" xmlns:r="http://schemas.openxmlformats.org/officeDocument/2006/relationships" xmlns:p="http://schemas.openxmlformats.org/presentationml/2006/main">
+  <p:cSld>
+    <p:spTree>
+      <p:nvGrpSpPr>
+        <p:cNvPr id="1" name=""/>
+        <p:cNvGrpSpPr/>
+        <p:nvPr/>
+      </p:nvGrpSpPr>
+      <p:grpSpPr>
+        <a:xfrm>
+          <a:off x="0" y="0"/>
+          <a:ext cx="0" cy="0"/>
+          <a:chOff x="0" y="0"/>
+          <a:chExt cx="0" cy="0"/>
+        </a:xfrm>
+      </p:grpSpPr>
+      <p:sp>
+        <p:nvSpPr>
+          <p:cNvPr id="2" name="Slide Image Placeholder 1"/>
+          <p:cNvSpPr>
+            <a:spLocks noGrp="1" noRot="1" noChangeAspect="1"/>
+          </p:cNvSpPr>
+          <p:nvPr>
+            <p:ph type="sldImg"/>
+          </p:nvPr>
+        </p:nvSpPr>
+        <p:spPr/>
+      </p:sp>
+      <p:sp>
+        <p:nvSpPr>
+          <p:cNvPr id="3" name="Notes Placeholder 2"/>
+          <p:cNvSpPr>
+            <a:spLocks noGrp="1"/>
+          </p:cNvSpPr>
+          <p:nvPr>
+            <p:ph type="body" idx="1"/>
+          </p:nvPr>
+        </p:nvSpPr>
+        <p:spPr/>
+        <p:txBody>
+          <a:bodyPr/>
+          <a:lstStyle/>
+          <a:p>
+            <a:endParaRPr lang="en-US" dirty="0"/>
+          </a:p>
+        </p:txBody>
+      </p:sp>
+      <p:sp>
+        <p:nvSpPr>
+          <p:cNvPr id="4" name="Slide Number Placeholder 3"/>
+          <p:cNvSpPr>
+            <a:spLocks noGrp="1"/>
+          </p:cNvSpPr>
+          <p:nvPr>
+            <p:ph type="sldNum" sz="quarter" idx="5"/>
+          </p:nvPr>
+        </p:nvSpPr>
+        <p:spPr/>
+        <p:txBody>
+          <a:bodyPr/>
+          <a:lstStyle/>
+          <a:p>
+            <a:fld id="{089AB531-42DD-4E57-818C-9DC7517959CC}" type="slidenum">
+              <a:rPr lang="en-US" smtClean="0"/>
+              <a:t>17</a:t>
+            </a:fld>
+            <a:endParaRPr lang="en-US"/>
+          </a:p>
+        </p:txBody>
+      </p:sp>
+    </p:spTree>
+    <p:extLst>
+      <p:ext uri="{BB962C8B-B14F-4D97-AF65-F5344CB8AC3E}">
+        <p14:creationId xmlns:p14="http://schemas.microsoft.com/office/powerpoint/2010/main" val="1686338489"/>
       </p:ext>
     </p:extLst>
   </p:cSld>
@@ -807,7 +1576,7 @@
           <a:p>
             <a:fld id="{AE1D7616-F1EA-4F87-8840-568991E174C4}" type="datetimeFigureOut">
               <a:rPr lang="en-US" smtClean="0"/>
-              <a:t>9/11/2025</a:t>
+              <a:t>9/24/2025</a:t>
             </a:fld>
             <a:endParaRPr lang="en-US"/>
           </a:p>
@@ -1005,7 +1774,7 @@
           <a:p>
             <a:fld id="{AE1D7616-F1EA-4F87-8840-568991E174C4}" type="datetimeFigureOut">
               <a:rPr lang="en-US" smtClean="0"/>
-              <a:t>9/11/2025</a:t>
+              <a:t>9/24/2025</a:t>
             </a:fld>
             <a:endParaRPr lang="en-US"/>
           </a:p>
@@ -1213,7 +1982,7 @@
           <a:p>
             <a:fld id="{AE1D7616-F1EA-4F87-8840-568991E174C4}" type="datetimeFigureOut">
               <a:rPr lang="en-US" smtClean="0"/>
-              <a:t>9/11/2025</a:t>
+              <a:t>9/24/2025</a:t>
             </a:fld>
             <a:endParaRPr lang="en-US"/>
           </a:p>
@@ -1411,7 +2180,7 @@
           <a:p>
             <a:fld id="{AE1D7616-F1EA-4F87-8840-568991E174C4}" type="datetimeFigureOut">
               <a:rPr lang="en-US" smtClean="0"/>
-              <a:t>9/11/2025</a:t>
+              <a:t>9/24/2025</a:t>
             </a:fld>
             <a:endParaRPr lang="en-US"/>
           </a:p>
@@ -1686,7 +2455,7 @@
           <a:p>
             <a:fld id="{AE1D7616-F1EA-4F87-8840-568991E174C4}" type="datetimeFigureOut">
               <a:rPr lang="en-US" smtClean="0"/>
-              <a:t>9/11/2025</a:t>
+              <a:t>9/24/2025</a:t>
             </a:fld>
             <a:endParaRPr lang="en-US"/>
           </a:p>
@@ -1951,7 +2720,7 @@
           <a:p>
             <a:fld id="{AE1D7616-F1EA-4F87-8840-568991E174C4}" type="datetimeFigureOut">
               <a:rPr lang="en-US" smtClean="0"/>
-              <a:t>9/11/2025</a:t>
+              <a:t>9/24/2025</a:t>
             </a:fld>
             <a:endParaRPr lang="en-US"/>
           </a:p>
@@ -2363,7 +3132,7 @@
           <a:p>
             <a:fld id="{AE1D7616-F1EA-4F87-8840-568991E174C4}" type="datetimeFigureOut">
               <a:rPr lang="en-US" smtClean="0"/>
-              <a:t>9/11/2025</a:t>
+              <a:t>9/24/2025</a:t>
             </a:fld>
             <a:endParaRPr lang="en-US"/>
           </a:p>
@@ -2504,7 +3273,7 @@
           <a:p>
             <a:fld id="{AE1D7616-F1EA-4F87-8840-568991E174C4}" type="datetimeFigureOut">
               <a:rPr lang="en-US" smtClean="0"/>
-              <a:t>9/11/2025</a:t>
+              <a:t>9/24/2025</a:t>
             </a:fld>
             <a:endParaRPr lang="en-US"/>
           </a:p>
@@ -2617,7 +3386,7 @@
           <a:p>
             <a:fld id="{AE1D7616-F1EA-4F87-8840-568991E174C4}" type="datetimeFigureOut">
               <a:rPr lang="en-US" smtClean="0"/>
-              <a:t>9/11/2025</a:t>
+              <a:t>9/24/2025</a:t>
             </a:fld>
             <a:endParaRPr lang="en-US"/>
           </a:p>
@@ -2928,7 +3697,7 @@
           <a:p>
             <a:fld id="{AE1D7616-F1EA-4F87-8840-568991E174C4}" type="datetimeFigureOut">
               <a:rPr lang="en-US" smtClean="0"/>
-              <a:t>9/11/2025</a:t>
+              <a:t>9/24/2025</a:t>
             </a:fld>
             <a:endParaRPr lang="en-US"/>
           </a:p>
@@ -3216,7 +3985,7 @@
           <a:p>
             <a:fld id="{AE1D7616-F1EA-4F87-8840-568991E174C4}" type="datetimeFigureOut">
               <a:rPr lang="en-US" smtClean="0"/>
-              <a:t>9/11/2025</a:t>
+              <a:t>9/24/2025</a:t>
             </a:fld>
             <a:endParaRPr lang="en-US"/>
           </a:p>
@@ -3457,7 +4226,7 @@
           <a:p>
             <a:fld id="{AE1D7616-F1EA-4F87-8840-568991E174C4}" type="datetimeFigureOut">
               <a:rPr lang="en-US" smtClean="0"/>
-              <a:t>9/11/2025</a:t>
+              <a:t>9/24/2025</a:t>
             </a:fld>
             <a:endParaRPr lang="en-US"/>
           </a:p>
@@ -3931,7 +4700,7 @@
           <a:p>
             <a:r>
               <a:rPr lang="en-US" dirty="0"/>
-              <a:t>9/11/2025</a:t>
+              <a:t>Last update 9/24/2025</a:t>
             </a:r>
           </a:p>
         </p:txBody>
@@ -3954,7 +4723,13 @@
   <p:cSld>
     <p:spTree>
       <p:nvGrpSpPr>
-        <p:cNvPr id="1" name=""/>
+        <p:cNvPr id="1" name="">
+          <a:extLst>
+            <a:ext uri="{FF2B5EF4-FFF2-40B4-BE49-F238E27FC236}">
+              <a16:creationId xmlns:a16="http://schemas.microsoft.com/office/drawing/2014/main" id="{1C8C3290-AFA5-38F1-DF58-3F7EF2624438}"/>
+            </a:ext>
+          </a:extLst>
+        </p:cNvPr>
         <p:cNvGrpSpPr/>
         <p:nvPr/>
       </p:nvGrpSpPr>
@@ -3971,7 +4746,7 @@
           <p:cNvPr id="2" name="Title 1">
             <a:extLst>
               <a:ext uri="{FF2B5EF4-FFF2-40B4-BE49-F238E27FC236}">
-                <a16:creationId xmlns:a16="http://schemas.microsoft.com/office/drawing/2014/main" id="{2E026C02-9456-53C2-4AAD-3B57C20C3C65}"/>
+                <a16:creationId xmlns:a16="http://schemas.microsoft.com/office/drawing/2014/main" id="{8F0D1949-448A-947F-1A56-A6A95FBB72C7}"/>
               </a:ext>
             </a:extLst>
           </p:cNvPr>
@@ -3999,7 +4774,7 @@
           <p:cNvPr id="3" name="Content Placeholder 2">
             <a:extLst>
               <a:ext uri="{FF2B5EF4-FFF2-40B4-BE49-F238E27FC236}">
-                <a16:creationId xmlns:a16="http://schemas.microsoft.com/office/drawing/2014/main" id="{07450B49-6BF5-5612-32D5-91EC0AB85680}"/>
+                <a16:creationId xmlns:a16="http://schemas.microsoft.com/office/drawing/2014/main" id="{A1B28C01-758C-3240-5AE6-E9D07A95DCFA}"/>
               </a:ext>
             </a:extLst>
           </p:cNvPr>
@@ -4017,11 +4792,11 @@
           <a:p>
             <a:r>
               <a:rPr lang="en-US" dirty="0"/>
-              <a:t>Expected output from </a:t>
+              <a:t>Expected output from method 2 – proc </a:t>
             </a:r>
             <a:r>
               <a:rPr lang="en-US" dirty="0" err="1"/>
-              <a:t>test_sql.sas</a:t>
+              <a:t>sql</a:t>
             </a:r>
             <a:endParaRPr lang="en-US" dirty="0"/>
           </a:p>
@@ -4035,10 +4810,10 @@
       </p:sp>
       <p:pic>
         <p:nvPicPr>
-          <p:cNvPr id="7" name="Picture 6">
-            <a:extLst>
-              <a:ext uri="{FF2B5EF4-FFF2-40B4-BE49-F238E27FC236}">
-                <a16:creationId xmlns:a16="http://schemas.microsoft.com/office/drawing/2014/main" id="{AFC47130-15C9-ACB6-5299-AA45B04B628B}"/>
+          <p:cNvPr id="8" name="Picture 7">
+            <a:extLst>
+              <a:ext uri="{FF2B5EF4-FFF2-40B4-BE49-F238E27FC236}">
+                <a16:creationId xmlns:a16="http://schemas.microsoft.com/office/drawing/2014/main" id="{BE05D9B3-9C18-E8C9-45DB-7D72CEDAB358}"/>
               </a:ext>
             </a:extLst>
           </p:cNvPr>
@@ -4055,8 +4830,8 @@
         </p:blipFill>
         <p:spPr>
           <a:xfrm>
-            <a:off x="2211421" y="2426266"/>
-            <a:ext cx="7769157" cy="4174296"/>
+            <a:off x="2814535" y="2560378"/>
+            <a:ext cx="5616615" cy="3429000"/>
           </a:xfrm>
           <a:prstGeom prst="rect">
             <a:avLst/>
@@ -4066,7 +4841,1650 @@
     </p:spTree>
     <p:extLst>
       <p:ext uri="{BB962C8B-B14F-4D97-AF65-F5344CB8AC3E}">
-        <p14:creationId xmlns:p14="http://schemas.microsoft.com/office/powerpoint/2010/main" val="3887250080"/>
+        <p14:creationId xmlns:p14="http://schemas.microsoft.com/office/powerpoint/2010/main" val="1270399107"/>
+      </p:ext>
+    </p:extLst>
+  </p:cSld>
+  <p:clrMapOvr>
+    <a:masterClrMapping/>
+  </p:clrMapOvr>
+</p:sld>
+</file>
+
+<file path=ppt/slides/slide11.xml><?xml version="1.0" encoding="utf-8"?>
+<p:sld xmlns:a="http://schemas.openxmlformats.org/drawingml/2006/main" xmlns:r="http://schemas.openxmlformats.org/officeDocument/2006/relationships" xmlns:p="http://schemas.openxmlformats.org/presentationml/2006/main">
+  <p:cSld>
+    <p:spTree>
+      <p:nvGrpSpPr>
+        <p:cNvPr id="1" name="">
+          <a:extLst>
+            <a:ext uri="{FF2B5EF4-FFF2-40B4-BE49-F238E27FC236}">
+              <a16:creationId xmlns:a16="http://schemas.microsoft.com/office/drawing/2014/main" id="{885CA3A1-0070-23BC-18CD-5051B31E9C22}"/>
+            </a:ext>
+          </a:extLst>
+        </p:cNvPr>
+        <p:cNvGrpSpPr/>
+        <p:nvPr/>
+      </p:nvGrpSpPr>
+      <p:grpSpPr>
+        <a:xfrm>
+          <a:off x="0" y="0"/>
+          <a:ext cx="0" cy="0"/>
+          <a:chOff x="0" y="0"/>
+          <a:chExt cx="0" cy="0"/>
+        </a:xfrm>
+      </p:grpSpPr>
+      <p:sp>
+        <p:nvSpPr>
+          <p:cNvPr id="2" name="Title 1">
+            <a:extLst>
+              <a:ext uri="{FF2B5EF4-FFF2-40B4-BE49-F238E27FC236}">
+                <a16:creationId xmlns:a16="http://schemas.microsoft.com/office/drawing/2014/main" id="{69521BAF-1A99-9022-292F-AE0200CE5B6B}"/>
+              </a:ext>
+            </a:extLst>
+          </p:cNvPr>
+          <p:cNvSpPr>
+            <a:spLocks noGrp="1"/>
+          </p:cNvSpPr>
+          <p:nvPr>
+            <p:ph type="title"/>
+          </p:nvPr>
+        </p:nvSpPr>
+        <p:spPr/>
+        <p:txBody>
+          <a:bodyPr/>
+          <a:lstStyle/>
+          <a:p>
+            <a:r>
+              <a:rPr lang="en-US" dirty="0"/>
+              <a:t>Connecting to DataWrangling2025 SQL Server through R</a:t>
+            </a:r>
+          </a:p>
+        </p:txBody>
+      </p:sp>
+      <p:sp>
+        <p:nvSpPr>
+          <p:cNvPr id="3" name="Content Placeholder 2">
+            <a:extLst>
+              <a:ext uri="{FF2B5EF4-FFF2-40B4-BE49-F238E27FC236}">
+                <a16:creationId xmlns:a16="http://schemas.microsoft.com/office/drawing/2014/main" id="{09D0A3D3-C883-376E-70A9-DBA3A2D98865}"/>
+              </a:ext>
+            </a:extLst>
+          </p:cNvPr>
+          <p:cNvSpPr>
+            <a:spLocks noGrp="1"/>
+          </p:cNvSpPr>
+          <p:nvPr>
+            <p:ph idx="1"/>
+          </p:nvPr>
+        </p:nvSpPr>
+        <p:spPr>
+          <a:xfrm>
+            <a:off x="838199" y="1825625"/>
+            <a:ext cx="10796081" cy="4351338"/>
+          </a:xfrm>
+        </p:spPr>
+        <p:txBody>
+          <a:bodyPr/>
+          <a:lstStyle/>
+          <a:p>
+            <a:pPr marL="0" lvl="1" indent="0">
+              <a:buNone/>
+              <a:tabLst>
+                <a:tab pos="460375" algn="l"/>
+              </a:tabLst>
+            </a:pPr>
+            <a:r>
+              <a:rPr lang="en-US" b="1" dirty="0"/>
+              <a:t>Adding DSN - DW_R into Windows OS</a:t>
+            </a:r>
+          </a:p>
+          <a:p>
+            <a:pPr marL="457200" lvl="1" indent="-457200">
+              <a:buFont typeface="+mj-lt"/>
+              <a:buAutoNum type="arabicPeriod"/>
+              <a:tabLst>
+                <a:tab pos="460375" algn="l"/>
+              </a:tabLst>
+            </a:pPr>
+            <a:r>
+              <a:rPr lang="en-US" dirty="0"/>
+              <a:t>Control panel -&gt;  ODBC Data Source Administrator -&gt; Add</a:t>
+            </a:r>
+          </a:p>
+          <a:p>
+            <a:pPr marL="0" indent="0">
+              <a:buNone/>
+            </a:pPr>
+            <a:endParaRPr lang="en-US" dirty="0"/>
+          </a:p>
+        </p:txBody>
+      </p:sp>
+      <p:pic>
+        <p:nvPicPr>
+          <p:cNvPr id="5" name="Picture 4">
+            <a:extLst>
+              <a:ext uri="{FF2B5EF4-FFF2-40B4-BE49-F238E27FC236}">
+                <a16:creationId xmlns:a16="http://schemas.microsoft.com/office/drawing/2014/main" id="{820276A0-D592-5046-8899-8310A53F79AA}"/>
+              </a:ext>
+            </a:extLst>
+          </p:cNvPr>
+          <p:cNvPicPr>
+            <a:picLocks noChangeAspect="1"/>
+          </p:cNvPicPr>
+          <p:nvPr/>
+        </p:nvPicPr>
+        <p:blipFill>
+          <a:blip r:embed="rId3"/>
+          <a:stretch>
+            <a:fillRect/>
+          </a:stretch>
+        </p:blipFill>
+        <p:spPr>
+          <a:xfrm>
+            <a:off x="561203" y="3102852"/>
+            <a:ext cx="5534797" cy="2429214"/>
+          </a:xfrm>
+          <a:prstGeom prst="rect">
+            <a:avLst/>
+          </a:prstGeom>
+        </p:spPr>
+      </p:pic>
+      <p:pic>
+        <p:nvPicPr>
+          <p:cNvPr id="8" name="Picture 7">
+            <a:extLst>
+              <a:ext uri="{FF2B5EF4-FFF2-40B4-BE49-F238E27FC236}">
+                <a16:creationId xmlns:a16="http://schemas.microsoft.com/office/drawing/2014/main" id="{E8D44D01-F01A-608A-C7B6-46A88CF3D715}"/>
+              </a:ext>
+            </a:extLst>
+          </p:cNvPr>
+          <p:cNvPicPr>
+            <a:picLocks noChangeAspect="1"/>
+          </p:cNvPicPr>
+          <p:nvPr/>
+        </p:nvPicPr>
+        <p:blipFill>
+          <a:blip r:embed="rId4"/>
+          <a:stretch>
+            <a:fillRect/>
+          </a:stretch>
+        </p:blipFill>
+        <p:spPr>
+          <a:xfrm>
+            <a:off x="6372996" y="2656682"/>
+            <a:ext cx="5715798" cy="4086795"/>
+          </a:xfrm>
+          <a:prstGeom prst="rect">
+            <a:avLst/>
+          </a:prstGeom>
+        </p:spPr>
+      </p:pic>
+    </p:spTree>
+    <p:extLst>
+      <p:ext uri="{BB962C8B-B14F-4D97-AF65-F5344CB8AC3E}">
+        <p14:creationId xmlns:p14="http://schemas.microsoft.com/office/powerpoint/2010/main" val="3957646541"/>
+      </p:ext>
+    </p:extLst>
+  </p:cSld>
+  <p:clrMapOvr>
+    <a:masterClrMapping/>
+  </p:clrMapOvr>
+</p:sld>
+</file>
+
+<file path=ppt/slides/slide12.xml><?xml version="1.0" encoding="utf-8"?>
+<p:sld xmlns:a="http://schemas.openxmlformats.org/drawingml/2006/main" xmlns:r="http://schemas.openxmlformats.org/officeDocument/2006/relationships" xmlns:p="http://schemas.openxmlformats.org/presentationml/2006/main">
+  <p:cSld>
+    <p:spTree>
+      <p:nvGrpSpPr>
+        <p:cNvPr id="1" name="">
+          <a:extLst>
+            <a:ext uri="{FF2B5EF4-FFF2-40B4-BE49-F238E27FC236}">
+              <a16:creationId xmlns:a16="http://schemas.microsoft.com/office/drawing/2014/main" id="{1E8CDE3B-4109-7B7F-9003-58C52F120A88}"/>
+            </a:ext>
+          </a:extLst>
+        </p:cNvPr>
+        <p:cNvGrpSpPr/>
+        <p:nvPr/>
+      </p:nvGrpSpPr>
+      <p:grpSpPr>
+        <a:xfrm>
+          <a:off x="0" y="0"/>
+          <a:ext cx="0" cy="0"/>
+          <a:chOff x="0" y="0"/>
+          <a:chExt cx="0" cy="0"/>
+        </a:xfrm>
+      </p:grpSpPr>
+      <p:sp>
+        <p:nvSpPr>
+          <p:cNvPr id="2" name="Title 1">
+            <a:extLst>
+              <a:ext uri="{FF2B5EF4-FFF2-40B4-BE49-F238E27FC236}">
+                <a16:creationId xmlns:a16="http://schemas.microsoft.com/office/drawing/2014/main" id="{9C15C443-6BDC-5C9C-4BAD-10D2F6C15D8D}"/>
+              </a:ext>
+            </a:extLst>
+          </p:cNvPr>
+          <p:cNvSpPr>
+            <a:spLocks noGrp="1"/>
+          </p:cNvSpPr>
+          <p:nvPr>
+            <p:ph type="title"/>
+          </p:nvPr>
+        </p:nvSpPr>
+        <p:spPr/>
+        <p:txBody>
+          <a:bodyPr/>
+          <a:lstStyle/>
+          <a:p>
+            <a:r>
+              <a:rPr lang="en-US" dirty="0"/>
+              <a:t>Connecting to DataWrangling2025 SQL Server through R (cont.)</a:t>
+            </a:r>
+          </a:p>
+        </p:txBody>
+      </p:sp>
+      <p:sp>
+        <p:nvSpPr>
+          <p:cNvPr id="3" name="Content Placeholder 2">
+            <a:extLst>
+              <a:ext uri="{FF2B5EF4-FFF2-40B4-BE49-F238E27FC236}">
+                <a16:creationId xmlns:a16="http://schemas.microsoft.com/office/drawing/2014/main" id="{05C43289-DD81-5866-56D9-9663BF20B304}"/>
+              </a:ext>
+            </a:extLst>
+          </p:cNvPr>
+          <p:cNvSpPr>
+            <a:spLocks noGrp="1"/>
+          </p:cNvSpPr>
+          <p:nvPr>
+            <p:ph idx="1"/>
+          </p:nvPr>
+        </p:nvSpPr>
+        <p:spPr>
+          <a:xfrm>
+            <a:off x="838199" y="1825625"/>
+            <a:ext cx="10796081" cy="4351338"/>
+          </a:xfrm>
+        </p:spPr>
+        <p:txBody>
+          <a:bodyPr/>
+          <a:lstStyle/>
+          <a:p>
+            <a:pPr marL="0" lvl="1" indent="0">
+              <a:buNone/>
+              <a:tabLst>
+                <a:tab pos="460375" algn="l"/>
+              </a:tabLst>
+            </a:pPr>
+            <a:r>
+              <a:rPr lang="en-US" b="1" dirty="0"/>
+              <a:t>Adding DSN - DW_R into Windows OS</a:t>
+            </a:r>
+          </a:p>
+          <a:p>
+            <a:pPr marL="0" lvl="1" indent="0">
+              <a:buNone/>
+              <a:tabLst>
+                <a:tab pos="460375" algn="l"/>
+              </a:tabLst>
+            </a:pPr>
+            <a:r>
+              <a:rPr lang="en-US" dirty="0"/>
+              <a:t>2. Select “ODBC Driver 17 for SQL Server” -&gt; Finish</a:t>
+            </a:r>
+          </a:p>
+          <a:p>
+            <a:pPr marL="0" lvl="1" indent="0">
+              <a:buNone/>
+              <a:tabLst>
+                <a:tab pos="460375" algn="l"/>
+              </a:tabLst>
+            </a:pPr>
+            <a:r>
+              <a:rPr lang="en-US" dirty="0"/>
+              <a:t>3. Name: DW_R -&gt; Server: DataWrangling2025 -&gt; Next</a:t>
+            </a:r>
+          </a:p>
+          <a:p>
+            <a:pPr marL="0" indent="0">
+              <a:buNone/>
+            </a:pPr>
+            <a:endParaRPr lang="en-US" dirty="0"/>
+          </a:p>
+        </p:txBody>
+      </p:sp>
+      <p:pic>
+        <p:nvPicPr>
+          <p:cNvPr id="6" name="Picture 5">
+            <a:extLst>
+              <a:ext uri="{FF2B5EF4-FFF2-40B4-BE49-F238E27FC236}">
+                <a16:creationId xmlns:a16="http://schemas.microsoft.com/office/drawing/2014/main" id="{4CD73A84-E97F-5B75-E118-027021AF230E}"/>
+              </a:ext>
+            </a:extLst>
+          </p:cNvPr>
+          <p:cNvPicPr>
+            <a:picLocks noChangeAspect="1"/>
+          </p:cNvPicPr>
+          <p:nvPr/>
+        </p:nvPicPr>
+        <p:blipFill>
+          <a:blip r:embed="rId3"/>
+          <a:stretch>
+            <a:fillRect/>
+          </a:stretch>
+        </p:blipFill>
+        <p:spPr>
+          <a:xfrm>
+            <a:off x="1364619" y="3195196"/>
+            <a:ext cx="4871620" cy="3400158"/>
+          </a:xfrm>
+          <a:prstGeom prst="rect">
+            <a:avLst/>
+          </a:prstGeom>
+        </p:spPr>
+      </p:pic>
+      <p:pic>
+        <p:nvPicPr>
+          <p:cNvPr id="9" name="Picture 8">
+            <a:extLst>
+              <a:ext uri="{FF2B5EF4-FFF2-40B4-BE49-F238E27FC236}">
+                <a16:creationId xmlns:a16="http://schemas.microsoft.com/office/drawing/2014/main" id="{258B15CF-2C30-96EB-2973-89F208F47A97}"/>
+              </a:ext>
+            </a:extLst>
+          </p:cNvPr>
+          <p:cNvPicPr>
+            <a:picLocks noChangeAspect="1"/>
+          </p:cNvPicPr>
+          <p:nvPr/>
+        </p:nvPicPr>
+        <p:blipFill>
+          <a:blip r:embed="rId4"/>
+          <a:stretch>
+            <a:fillRect/>
+          </a:stretch>
+        </p:blipFill>
+        <p:spPr>
+          <a:xfrm>
+            <a:off x="7212055" y="3195196"/>
+            <a:ext cx="3909901" cy="3480527"/>
+          </a:xfrm>
+          <a:prstGeom prst="rect">
+            <a:avLst/>
+          </a:prstGeom>
+        </p:spPr>
+      </p:pic>
+    </p:spTree>
+    <p:extLst>
+      <p:ext uri="{BB962C8B-B14F-4D97-AF65-F5344CB8AC3E}">
+        <p14:creationId xmlns:p14="http://schemas.microsoft.com/office/powerpoint/2010/main" val="1750025333"/>
+      </p:ext>
+    </p:extLst>
+  </p:cSld>
+  <p:clrMapOvr>
+    <a:masterClrMapping/>
+  </p:clrMapOvr>
+</p:sld>
+</file>
+
+<file path=ppt/slides/slide13.xml><?xml version="1.0" encoding="utf-8"?>
+<p:sld xmlns:a="http://schemas.openxmlformats.org/drawingml/2006/main" xmlns:r="http://schemas.openxmlformats.org/officeDocument/2006/relationships" xmlns:p="http://schemas.openxmlformats.org/presentationml/2006/main">
+  <p:cSld>
+    <p:spTree>
+      <p:nvGrpSpPr>
+        <p:cNvPr id="1" name="">
+          <a:extLst>
+            <a:ext uri="{FF2B5EF4-FFF2-40B4-BE49-F238E27FC236}">
+              <a16:creationId xmlns:a16="http://schemas.microsoft.com/office/drawing/2014/main" id="{568286FC-A9C8-F033-A837-4B328E45CD5A}"/>
+            </a:ext>
+          </a:extLst>
+        </p:cNvPr>
+        <p:cNvGrpSpPr/>
+        <p:nvPr/>
+      </p:nvGrpSpPr>
+      <p:grpSpPr>
+        <a:xfrm>
+          <a:off x="0" y="0"/>
+          <a:ext cx="0" cy="0"/>
+          <a:chOff x="0" y="0"/>
+          <a:chExt cx="0" cy="0"/>
+        </a:xfrm>
+      </p:grpSpPr>
+      <p:sp>
+        <p:nvSpPr>
+          <p:cNvPr id="2" name="Title 1">
+            <a:extLst>
+              <a:ext uri="{FF2B5EF4-FFF2-40B4-BE49-F238E27FC236}">
+                <a16:creationId xmlns:a16="http://schemas.microsoft.com/office/drawing/2014/main" id="{D251A524-FFE9-D83C-9CBA-862B364DFD25}"/>
+              </a:ext>
+            </a:extLst>
+          </p:cNvPr>
+          <p:cNvSpPr>
+            <a:spLocks noGrp="1"/>
+          </p:cNvSpPr>
+          <p:nvPr>
+            <p:ph type="title"/>
+          </p:nvPr>
+        </p:nvSpPr>
+        <p:spPr/>
+        <p:txBody>
+          <a:bodyPr/>
+          <a:lstStyle/>
+          <a:p>
+            <a:r>
+              <a:rPr lang="en-US" dirty="0"/>
+              <a:t>Connecting to DataWrangling2025 SQL Server through R (cont.)</a:t>
+            </a:r>
+          </a:p>
+        </p:txBody>
+      </p:sp>
+      <p:sp>
+        <p:nvSpPr>
+          <p:cNvPr id="3" name="Content Placeholder 2">
+            <a:extLst>
+              <a:ext uri="{FF2B5EF4-FFF2-40B4-BE49-F238E27FC236}">
+                <a16:creationId xmlns:a16="http://schemas.microsoft.com/office/drawing/2014/main" id="{361F0547-9484-8FBF-36AD-B6CA20D0CE7B}"/>
+              </a:ext>
+            </a:extLst>
+          </p:cNvPr>
+          <p:cNvSpPr>
+            <a:spLocks noGrp="1"/>
+          </p:cNvSpPr>
+          <p:nvPr>
+            <p:ph idx="1"/>
+          </p:nvPr>
+        </p:nvSpPr>
+        <p:spPr>
+          <a:xfrm>
+            <a:off x="838199" y="1825625"/>
+            <a:ext cx="10796081" cy="4351338"/>
+          </a:xfrm>
+        </p:spPr>
+        <p:txBody>
+          <a:bodyPr/>
+          <a:lstStyle/>
+          <a:p>
+            <a:pPr marL="0" lvl="1" indent="0">
+              <a:buNone/>
+              <a:tabLst>
+                <a:tab pos="460375" algn="l"/>
+              </a:tabLst>
+            </a:pPr>
+            <a:r>
+              <a:rPr lang="en-US" b="1" dirty="0"/>
+              <a:t>Adding DSN - DW_R into Windows OS</a:t>
+            </a:r>
+          </a:p>
+          <a:p>
+            <a:pPr marL="0" indent="0">
+              <a:spcBef>
+                <a:spcPts val="0"/>
+              </a:spcBef>
+              <a:spcAft>
+                <a:spcPts val="600"/>
+              </a:spcAft>
+              <a:buNone/>
+            </a:pPr>
+            <a:r>
+              <a:rPr lang="en-US" dirty="0"/>
+              <a:t>4. Windows authentication -&gt; Next</a:t>
+            </a:r>
+          </a:p>
+          <a:p>
+            <a:pPr marL="0" indent="0">
+              <a:spcBef>
+                <a:spcPts val="0"/>
+              </a:spcBef>
+              <a:spcAft>
+                <a:spcPts val="600"/>
+              </a:spcAft>
+              <a:buNone/>
+            </a:pPr>
+            <a:r>
+              <a:rPr lang="en-US" sz="2400" dirty="0"/>
+              <a:t>5. Check “Change the default database to” -&gt; select </a:t>
+            </a:r>
+            <a:r>
+              <a:rPr lang="en-US" sz="2400" dirty="0" err="1"/>
+              <a:t>datawrangling_R</a:t>
+            </a:r>
+            <a:r>
+              <a:rPr lang="en-US" sz="2400" dirty="0"/>
+              <a:t> -&gt; Next</a:t>
+            </a:r>
+          </a:p>
+          <a:p>
+            <a:pPr marL="0" indent="0">
+              <a:spcBef>
+                <a:spcPts val="0"/>
+              </a:spcBef>
+              <a:spcAft>
+                <a:spcPts val="600"/>
+              </a:spcAft>
+              <a:buNone/>
+            </a:pPr>
+            <a:r>
+              <a:rPr lang="en-US" sz="2400" dirty="0"/>
+              <a:t>6. Click “Finish”</a:t>
+            </a:r>
+          </a:p>
+        </p:txBody>
+      </p:sp>
+      <p:pic>
+        <p:nvPicPr>
+          <p:cNvPr id="5" name="Picture 4">
+            <a:extLst>
+              <a:ext uri="{FF2B5EF4-FFF2-40B4-BE49-F238E27FC236}">
+                <a16:creationId xmlns:a16="http://schemas.microsoft.com/office/drawing/2014/main" id="{E32E4CFA-82DD-CC0F-F43C-1339EA456066}"/>
+              </a:ext>
+            </a:extLst>
+          </p:cNvPr>
+          <p:cNvPicPr>
+            <a:picLocks noChangeAspect="1"/>
+          </p:cNvPicPr>
+          <p:nvPr/>
+        </p:nvPicPr>
+        <p:blipFill>
+          <a:blip r:embed="rId3"/>
+          <a:stretch>
+            <a:fillRect/>
+          </a:stretch>
+        </p:blipFill>
+        <p:spPr>
+          <a:xfrm>
+            <a:off x="446660" y="3514139"/>
+            <a:ext cx="3574631" cy="3178783"/>
+          </a:xfrm>
+          <a:prstGeom prst="rect">
+            <a:avLst/>
+          </a:prstGeom>
+        </p:spPr>
+      </p:pic>
+      <p:pic>
+        <p:nvPicPr>
+          <p:cNvPr id="8" name="Picture 7">
+            <a:extLst>
+              <a:ext uri="{FF2B5EF4-FFF2-40B4-BE49-F238E27FC236}">
+                <a16:creationId xmlns:a16="http://schemas.microsoft.com/office/drawing/2014/main" id="{18E37DDA-41BA-0345-DC6C-1FEA68CF2E82}"/>
+              </a:ext>
+            </a:extLst>
+          </p:cNvPr>
+          <p:cNvPicPr>
+            <a:picLocks noChangeAspect="1"/>
+          </p:cNvPicPr>
+          <p:nvPr/>
+        </p:nvPicPr>
+        <p:blipFill>
+          <a:blip r:embed="rId4"/>
+          <a:stretch>
+            <a:fillRect/>
+          </a:stretch>
+        </p:blipFill>
+        <p:spPr>
+          <a:xfrm>
+            <a:off x="4319082" y="3514139"/>
+            <a:ext cx="3655970" cy="3283037"/>
+          </a:xfrm>
+          <a:prstGeom prst="rect">
+            <a:avLst/>
+          </a:prstGeom>
+        </p:spPr>
+      </p:pic>
+      <p:pic>
+        <p:nvPicPr>
+          <p:cNvPr id="11" name="Picture 10">
+            <a:extLst>
+              <a:ext uri="{FF2B5EF4-FFF2-40B4-BE49-F238E27FC236}">
+                <a16:creationId xmlns:a16="http://schemas.microsoft.com/office/drawing/2014/main" id="{D5A63C9D-1406-C3C9-E72D-0DF54FCD2EBD}"/>
+              </a:ext>
+            </a:extLst>
+          </p:cNvPr>
+          <p:cNvPicPr>
+            <a:picLocks noChangeAspect="1"/>
+          </p:cNvPicPr>
+          <p:nvPr/>
+        </p:nvPicPr>
+        <p:blipFill>
+          <a:blip r:embed="rId5"/>
+          <a:stretch>
+            <a:fillRect/>
+          </a:stretch>
+        </p:blipFill>
+        <p:spPr>
+          <a:xfrm>
+            <a:off x="8325768" y="3539191"/>
+            <a:ext cx="3623367" cy="3257985"/>
+          </a:xfrm>
+          <a:prstGeom prst="rect">
+            <a:avLst/>
+          </a:prstGeom>
+        </p:spPr>
+      </p:pic>
+    </p:spTree>
+    <p:extLst>
+      <p:ext uri="{BB962C8B-B14F-4D97-AF65-F5344CB8AC3E}">
+        <p14:creationId xmlns:p14="http://schemas.microsoft.com/office/powerpoint/2010/main" val="973861543"/>
+      </p:ext>
+    </p:extLst>
+  </p:cSld>
+  <p:clrMapOvr>
+    <a:masterClrMapping/>
+  </p:clrMapOvr>
+</p:sld>
+</file>
+
+<file path=ppt/slides/slide14.xml><?xml version="1.0" encoding="utf-8"?>
+<p:sld xmlns:a="http://schemas.openxmlformats.org/drawingml/2006/main" xmlns:r="http://schemas.openxmlformats.org/officeDocument/2006/relationships" xmlns:p="http://schemas.openxmlformats.org/presentationml/2006/main">
+  <p:cSld>
+    <p:spTree>
+      <p:nvGrpSpPr>
+        <p:cNvPr id="1" name="">
+          <a:extLst>
+            <a:ext uri="{FF2B5EF4-FFF2-40B4-BE49-F238E27FC236}">
+              <a16:creationId xmlns:a16="http://schemas.microsoft.com/office/drawing/2014/main" id="{8F863419-CE82-0C7F-D0A0-073380D4E3E3}"/>
+            </a:ext>
+          </a:extLst>
+        </p:cNvPr>
+        <p:cNvGrpSpPr/>
+        <p:nvPr/>
+      </p:nvGrpSpPr>
+      <p:grpSpPr>
+        <a:xfrm>
+          <a:off x="0" y="0"/>
+          <a:ext cx="0" cy="0"/>
+          <a:chOff x="0" y="0"/>
+          <a:chExt cx="0" cy="0"/>
+        </a:xfrm>
+      </p:grpSpPr>
+      <p:sp>
+        <p:nvSpPr>
+          <p:cNvPr id="2" name="Title 1">
+            <a:extLst>
+              <a:ext uri="{FF2B5EF4-FFF2-40B4-BE49-F238E27FC236}">
+                <a16:creationId xmlns:a16="http://schemas.microsoft.com/office/drawing/2014/main" id="{ED4A8051-538E-0BFC-2411-32FCFFB88EDE}"/>
+              </a:ext>
+            </a:extLst>
+          </p:cNvPr>
+          <p:cNvSpPr>
+            <a:spLocks noGrp="1"/>
+          </p:cNvSpPr>
+          <p:nvPr>
+            <p:ph type="title"/>
+          </p:nvPr>
+        </p:nvSpPr>
+        <p:spPr/>
+        <p:txBody>
+          <a:bodyPr/>
+          <a:lstStyle/>
+          <a:p>
+            <a:r>
+              <a:rPr lang="en-US" dirty="0"/>
+              <a:t>Connecting to DataWrangling2025 SQL Server through R (cont.)</a:t>
+            </a:r>
+          </a:p>
+        </p:txBody>
+      </p:sp>
+      <p:sp>
+        <p:nvSpPr>
+          <p:cNvPr id="3" name="Content Placeholder 2">
+            <a:extLst>
+              <a:ext uri="{FF2B5EF4-FFF2-40B4-BE49-F238E27FC236}">
+                <a16:creationId xmlns:a16="http://schemas.microsoft.com/office/drawing/2014/main" id="{DD13B826-7767-3AA9-A7B0-ECEA9229DB93}"/>
+              </a:ext>
+            </a:extLst>
+          </p:cNvPr>
+          <p:cNvSpPr>
+            <a:spLocks noGrp="1"/>
+          </p:cNvSpPr>
+          <p:nvPr>
+            <p:ph idx="1"/>
+          </p:nvPr>
+        </p:nvSpPr>
+        <p:spPr>
+          <a:xfrm>
+            <a:off x="838199" y="1825625"/>
+            <a:ext cx="10796081" cy="4351338"/>
+          </a:xfrm>
+        </p:spPr>
+        <p:txBody>
+          <a:bodyPr/>
+          <a:lstStyle/>
+          <a:p>
+            <a:pPr marL="0" lvl="1" indent="0">
+              <a:buNone/>
+              <a:tabLst>
+                <a:tab pos="460375" algn="l"/>
+              </a:tabLst>
+            </a:pPr>
+            <a:r>
+              <a:rPr lang="en-US" b="1" dirty="0"/>
+              <a:t>Adding DSN - DW_R into Windows OS</a:t>
+            </a:r>
+          </a:p>
+          <a:p>
+            <a:pPr marL="0" lvl="1" indent="0">
+              <a:buNone/>
+              <a:tabLst>
+                <a:tab pos="460375" algn="l"/>
+              </a:tabLst>
+            </a:pPr>
+            <a:r>
+              <a:rPr lang="en-US" dirty="0"/>
+              <a:t>7. Test data source -&gt; “Test completed successfully!” -&gt; OK -&gt; OK</a:t>
+            </a:r>
+          </a:p>
+        </p:txBody>
+      </p:sp>
+      <p:pic>
+        <p:nvPicPr>
+          <p:cNvPr id="6" name="Picture 5">
+            <a:extLst>
+              <a:ext uri="{FF2B5EF4-FFF2-40B4-BE49-F238E27FC236}">
+                <a16:creationId xmlns:a16="http://schemas.microsoft.com/office/drawing/2014/main" id="{03E015CB-F223-761E-8636-001D6595C2C0}"/>
+              </a:ext>
+            </a:extLst>
+          </p:cNvPr>
+          <p:cNvPicPr>
+            <a:picLocks noChangeAspect="1"/>
+          </p:cNvPicPr>
+          <p:nvPr/>
+        </p:nvPicPr>
+        <p:blipFill>
+          <a:blip r:embed="rId3"/>
+          <a:stretch>
+            <a:fillRect/>
+          </a:stretch>
+        </p:blipFill>
+        <p:spPr>
+          <a:xfrm>
+            <a:off x="330741" y="3081020"/>
+            <a:ext cx="4072646" cy="3290004"/>
+          </a:xfrm>
+          <a:prstGeom prst="rect">
+            <a:avLst/>
+          </a:prstGeom>
+        </p:spPr>
+      </p:pic>
+      <p:pic>
+        <p:nvPicPr>
+          <p:cNvPr id="9" name="Picture 8">
+            <a:extLst>
+              <a:ext uri="{FF2B5EF4-FFF2-40B4-BE49-F238E27FC236}">
+                <a16:creationId xmlns:a16="http://schemas.microsoft.com/office/drawing/2014/main" id="{A56EDF82-5140-D259-3E73-99899EB48BE0}"/>
+              </a:ext>
+            </a:extLst>
+          </p:cNvPr>
+          <p:cNvPicPr>
+            <a:picLocks noChangeAspect="1"/>
+          </p:cNvPicPr>
+          <p:nvPr/>
+        </p:nvPicPr>
+        <p:blipFill>
+          <a:blip r:embed="rId4"/>
+          <a:stretch>
+            <a:fillRect/>
+          </a:stretch>
+        </p:blipFill>
+        <p:spPr>
+          <a:xfrm>
+            <a:off x="4740613" y="3081020"/>
+            <a:ext cx="3154466" cy="3366531"/>
+          </a:xfrm>
+          <a:prstGeom prst="rect">
+            <a:avLst/>
+          </a:prstGeom>
+        </p:spPr>
+      </p:pic>
+    </p:spTree>
+    <p:extLst>
+      <p:ext uri="{BB962C8B-B14F-4D97-AF65-F5344CB8AC3E}">
+        <p14:creationId xmlns:p14="http://schemas.microsoft.com/office/powerpoint/2010/main" val="1876206438"/>
+      </p:ext>
+    </p:extLst>
+  </p:cSld>
+  <p:clrMapOvr>
+    <a:masterClrMapping/>
+  </p:clrMapOvr>
+</p:sld>
+</file>
+
+<file path=ppt/slides/slide15.xml><?xml version="1.0" encoding="utf-8"?>
+<p:sld xmlns:a="http://schemas.openxmlformats.org/drawingml/2006/main" xmlns:r="http://schemas.openxmlformats.org/officeDocument/2006/relationships" xmlns:p="http://schemas.openxmlformats.org/presentationml/2006/main">
+  <p:cSld>
+    <p:spTree>
+      <p:nvGrpSpPr>
+        <p:cNvPr id="1" name="">
+          <a:extLst>
+            <a:ext uri="{FF2B5EF4-FFF2-40B4-BE49-F238E27FC236}">
+              <a16:creationId xmlns:a16="http://schemas.microsoft.com/office/drawing/2014/main" id="{05FED4AC-8D35-A112-8442-D40A1BBA7E3A}"/>
+            </a:ext>
+          </a:extLst>
+        </p:cNvPr>
+        <p:cNvGrpSpPr/>
+        <p:nvPr/>
+      </p:nvGrpSpPr>
+      <p:grpSpPr>
+        <a:xfrm>
+          <a:off x="0" y="0"/>
+          <a:ext cx="0" cy="0"/>
+          <a:chOff x="0" y="0"/>
+          <a:chExt cx="0" cy="0"/>
+        </a:xfrm>
+      </p:grpSpPr>
+      <p:sp>
+        <p:nvSpPr>
+          <p:cNvPr id="2" name="Title 1">
+            <a:extLst>
+              <a:ext uri="{FF2B5EF4-FFF2-40B4-BE49-F238E27FC236}">
+                <a16:creationId xmlns:a16="http://schemas.microsoft.com/office/drawing/2014/main" id="{D4726FC8-55BC-5B2D-29EC-D680A49E22B8}"/>
+              </a:ext>
+            </a:extLst>
+          </p:cNvPr>
+          <p:cNvSpPr>
+            <a:spLocks noGrp="1"/>
+          </p:cNvSpPr>
+          <p:nvPr>
+            <p:ph type="title"/>
+          </p:nvPr>
+        </p:nvSpPr>
+        <p:spPr/>
+        <p:txBody>
+          <a:bodyPr/>
+          <a:lstStyle/>
+          <a:p>
+            <a:r>
+              <a:rPr lang="en-US" dirty="0"/>
+              <a:t>Connecting to DataWrangling2025 SQL Server through R (cont.)</a:t>
+            </a:r>
+          </a:p>
+        </p:txBody>
+      </p:sp>
+      <p:sp>
+        <p:nvSpPr>
+          <p:cNvPr id="3" name="Content Placeholder 2">
+            <a:extLst>
+              <a:ext uri="{FF2B5EF4-FFF2-40B4-BE49-F238E27FC236}">
+                <a16:creationId xmlns:a16="http://schemas.microsoft.com/office/drawing/2014/main" id="{A035B297-AE75-FCE8-6317-E4E7B66DF518}"/>
+              </a:ext>
+            </a:extLst>
+          </p:cNvPr>
+          <p:cNvSpPr>
+            <a:spLocks noGrp="1"/>
+          </p:cNvSpPr>
+          <p:nvPr>
+            <p:ph idx="1"/>
+          </p:nvPr>
+        </p:nvSpPr>
+        <p:spPr>
+          <a:xfrm>
+            <a:off x="838199" y="1825625"/>
+            <a:ext cx="10796081" cy="4351338"/>
+          </a:xfrm>
+        </p:spPr>
+        <p:txBody>
+          <a:bodyPr/>
+          <a:lstStyle/>
+          <a:p>
+            <a:pPr marL="0" lvl="1" indent="0">
+              <a:buNone/>
+              <a:tabLst>
+                <a:tab pos="460375" algn="l"/>
+              </a:tabLst>
+            </a:pPr>
+            <a:r>
+              <a:rPr lang="en-US" b="1" dirty="0"/>
+              <a:t>Adding DSN - </a:t>
+            </a:r>
+            <a:r>
+              <a:rPr lang="en-US" b="1" dirty="0">
+                <a:solidFill>
+                  <a:srgbClr val="FF0000"/>
+                </a:solidFill>
+              </a:rPr>
+              <a:t>DW_SQL </a:t>
+            </a:r>
+            <a:r>
+              <a:rPr lang="en-US" b="1" dirty="0"/>
+              <a:t>into Windows OS</a:t>
+            </a:r>
+          </a:p>
+          <a:p>
+            <a:pPr marL="0" lvl="1" indent="0">
+              <a:buNone/>
+              <a:tabLst>
+                <a:tab pos="460375" algn="l"/>
+              </a:tabLst>
+            </a:pPr>
+            <a:endParaRPr lang="en-US" b="1" dirty="0"/>
+          </a:p>
+          <a:p>
+            <a:pPr marL="457200" lvl="1" indent="-457200">
+              <a:buFont typeface="+mj-lt"/>
+              <a:buAutoNum type="arabicPeriod"/>
+              <a:tabLst>
+                <a:tab pos="460375" algn="l"/>
+              </a:tabLst>
+            </a:pPr>
+            <a:r>
+              <a:rPr lang="en-US" dirty="0"/>
+              <a:t>Control panel -&gt;  ODBC Data Source Administrator -&gt; Add</a:t>
+            </a:r>
+          </a:p>
+          <a:p>
+            <a:pPr marL="457200" lvl="1" indent="-457200">
+              <a:buFont typeface="+mj-lt"/>
+              <a:buAutoNum type="arabicPeriod"/>
+              <a:tabLst>
+                <a:tab pos="460375" algn="l"/>
+              </a:tabLst>
+            </a:pPr>
+            <a:r>
+              <a:rPr lang="en-US" dirty="0"/>
+              <a:t>Select “ODBC Driver 17 for SQL Server” -&gt; Finish</a:t>
+            </a:r>
+          </a:p>
+          <a:p>
+            <a:pPr marL="457200" lvl="1" indent="-457200">
+              <a:buFont typeface="+mj-lt"/>
+              <a:buAutoNum type="arabicPeriod"/>
+              <a:tabLst>
+                <a:tab pos="460375" algn="l"/>
+              </a:tabLst>
+            </a:pPr>
+            <a:r>
+              <a:rPr lang="en-US" dirty="0"/>
+              <a:t>Name: </a:t>
+            </a:r>
+            <a:r>
+              <a:rPr lang="en-US" dirty="0">
+                <a:solidFill>
+                  <a:srgbClr val="FF0000"/>
+                </a:solidFill>
+              </a:rPr>
+              <a:t>DW_SQL </a:t>
+            </a:r>
+            <a:r>
+              <a:rPr lang="en-US" dirty="0"/>
+              <a:t>-&gt; Server: DataWrangling2025 -&gt; Next</a:t>
+            </a:r>
+          </a:p>
+          <a:p>
+            <a:pPr marL="457200" lvl="1" indent="-457200">
+              <a:spcAft>
+                <a:spcPts val="600"/>
+              </a:spcAft>
+              <a:buFont typeface="+mj-lt"/>
+              <a:buAutoNum type="arabicPeriod"/>
+              <a:tabLst>
+                <a:tab pos="460375" algn="l"/>
+              </a:tabLst>
+            </a:pPr>
+            <a:r>
+              <a:rPr lang="en-US" dirty="0"/>
+              <a:t>Windows authentication -&gt; Next</a:t>
+            </a:r>
+          </a:p>
+          <a:p>
+            <a:pPr marL="457200" lvl="1" indent="-457200">
+              <a:spcAft>
+                <a:spcPts val="600"/>
+              </a:spcAft>
+              <a:buFont typeface="+mj-lt"/>
+              <a:buAutoNum type="arabicPeriod"/>
+              <a:tabLst>
+                <a:tab pos="460375" algn="l"/>
+              </a:tabLst>
+            </a:pPr>
+            <a:r>
+              <a:rPr lang="en-US" dirty="0"/>
+              <a:t>Check “Change the default database to” -&gt; select </a:t>
+            </a:r>
+            <a:r>
+              <a:rPr lang="en-US" dirty="0" err="1">
+                <a:solidFill>
+                  <a:srgbClr val="FF0000"/>
+                </a:solidFill>
+              </a:rPr>
+              <a:t>datawrangling_SQL</a:t>
+            </a:r>
+            <a:r>
+              <a:rPr lang="en-US" dirty="0"/>
+              <a:t> -&gt; Next</a:t>
+            </a:r>
+          </a:p>
+          <a:p>
+            <a:pPr marL="457200" lvl="1" indent="-457200">
+              <a:spcAft>
+                <a:spcPts val="600"/>
+              </a:spcAft>
+              <a:buFont typeface="+mj-lt"/>
+              <a:buAutoNum type="arabicPeriod"/>
+              <a:tabLst>
+                <a:tab pos="460375" algn="l"/>
+              </a:tabLst>
+            </a:pPr>
+            <a:r>
+              <a:rPr lang="en-US" dirty="0"/>
+              <a:t>Click “Finish”</a:t>
+            </a:r>
+          </a:p>
+          <a:p>
+            <a:pPr marL="457200" lvl="1" indent="-457200">
+              <a:spcAft>
+                <a:spcPts val="600"/>
+              </a:spcAft>
+              <a:buFont typeface="+mj-lt"/>
+              <a:buAutoNum type="arabicPeriod"/>
+              <a:tabLst>
+                <a:tab pos="460375" algn="l"/>
+              </a:tabLst>
+            </a:pPr>
+            <a:r>
+              <a:rPr lang="en-US" dirty="0"/>
+              <a:t>Test data source -&gt; “Test completed successfully!” -&gt; OK -&gt; OK</a:t>
+            </a:r>
+          </a:p>
+          <a:p>
+            <a:pPr marL="0" lvl="1" indent="0">
+              <a:buNone/>
+              <a:tabLst>
+                <a:tab pos="460375" algn="l"/>
+              </a:tabLst>
+            </a:pPr>
+            <a:endParaRPr lang="en-US" dirty="0"/>
+          </a:p>
+          <a:p>
+            <a:pPr marL="457200" lvl="1" indent="-457200">
+              <a:buFont typeface="+mj-lt"/>
+              <a:buAutoNum type="arabicPeriod"/>
+              <a:tabLst>
+                <a:tab pos="460375" algn="l"/>
+              </a:tabLst>
+            </a:pPr>
+            <a:endParaRPr lang="en-US" dirty="0"/>
+          </a:p>
+          <a:p>
+            <a:pPr marL="457200" lvl="1" indent="-457200">
+              <a:buFont typeface="+mj-lt"/>
+              <a:buAutoNum type="arabicPeriod"/>
+              <a:tabLst>
+                <a:tab pos="460375" algn="l"/>
+              </a:tabLst>
+            </a:pPr>
+            <a:endParaRPr lang="en-US" dirty="0"/>
+          </a:p>
+        </p:txBody>
+      </p:sp>
+    </p:spTree>
+    <p:extLst>
+      <p:ext uri="{BB962C8B-B14F-4D97-AF65-F5344CB8AC3E}">
+        <p14:creationId xmlns:p14="http://schemas.microsoft.com/office/powerpoint/2010/main" val="2464187142"/>
+      </p:ext>
+    </p:extLst>
+  </p:cSld>
+  <p:clrMapOvr>
+    <a:masterClrMapping/>
+  </p:clrMapOvr>
+</p:sld>
+</file>
+
+<file path=ppt/slides/slide16.xml><?xml version="1.0" encoding="utf-8"?>
+<p:sld xmlns:a="http://schemas.openxmlformats.org/drawingml/2006/main" xmlns:r="http://schemas.openxmlformats.org/officeDocument/2006/relationships" xmlns:p="http://schemas.openxmlformats.org/presentationml/2006/main">
+  <p:cSld>
+    <p:spTree>
+      <p:nvGrpSpPr>
+        <p:cNvPr id="1" name="">
+          <a:extLst>
+            <a:ext uri="{FF2B5EF4-FFF2-40B4-BE49-F238E27FC236}">
+              <a16:creationId xmlns:a16="http://schemas.microsoft.com/office/drawing/2014/main" id="{0DBF730C-31A7-10B3-72A7-878E04272541}"/>
+            </a:ext>
+          </a:extLst>
+        </p:cNvPr>
+        <p:cNvGrpSpPr/>
+        <p:nvPr/>
+      </p:nvGrpSpPr>
+      <p:grpSpPr>
+        <a:xfrm>
+          <a:off x="0" y="0"/>
+          <a:ext cx="0" cy="0"/>
+          <a:chOff x="0" y="0"/>
+          <a:chExt cx="0" cy="0"/>
+        </a:xfrm>
+      </p:grpSpPr>
+      <p:sp>
+        <p:nvSpPr>
+          <p:cNvPr id="2" name="Title 1">
+            <a:extLst>
+              <a:ext uri="{FF2B5EF4-FFF2-40B4-BE49-F238E27FC236}">
+                <a16:creationId xmlns:a16="http://schemas.microsoft.com/office/drawing/2014/main" id="{3F928696-58A5-46DC-9D67-88CA9FB20FDD}"/>
+              </a:ext>
+            </a:extLst>
+          </p:cNvPr>
+          <p:cNvSpPr>
+            <a:spLocks noGrp="1"/>
+          </p:cNvSpPr>
+          <p:nvPr>
+            <p:ph type="title"/>
+          </p:nvPr>
+        </p:nvSpPr>
+        <p:spPr/>
+        <p:txBody>
+          <a:bodyPr/>
+          <a:lstStyle/>
+          <a:p>
+            <a:r>
+              <a:rPr lang="en-US" dirty="0"/>
+              <a:t>Connecting to DataWrangling2025 SQL Server through R (cont.)</a:t>
+            </a:r>
+          </a:p>
+        </p:txBody>
+      </p:sp>
+      <p:sp>
+        <p:nvSpPr>
+          <p:cNvPr id="3" name="Content Placeholder 2">
+            <a:extLst>
+              <a:ext uri="{FF2B5EF4-FFF2-40B4-BE49-F238E27FC236}">
+                <a16:creationId xmlns:a16="http://schemas.microsoft.com/office/drawing/2014/main" id="{6F34E613-19AD-CDE9-9631-0BB65781BED2}"/>
+              </a:ext>
+            </a:extLst>
+          </p:cNvPr>
+          <p:cNvSpPr>
+            <a:spLocks noGrp="1"/>
+          </p:cNvSpPr>
+          <p:nvPr>
+            <p:ph idx="1"/>
+          </p:nvPr>
+        </p:nvSpPr>
+        <p:spPr>
+          <a:xfrm>
+            <a:off x="838199" y="1825625"/>
+            <a:ext cx="10796081" cy="4351338"/>
+          </a:xfrm>
+        </p:spPr>
+        <p:txBody>
+          <a:bodyPr/>
+          <a:lstStyle/>
+          <a:p>
+            <a:pPr marL="0" lvl="1" indent="0">
+              <a:buNone/>
+              <a:tabLst>
+                <a:tab pos="460375" algn="l"/>
+              </a:tabLst>
+            </a:pPr>
+            <a:r>
+              <a:rPr lang="en-US" b="1" dirty="0"/>
+              <a:t>Adding DSN - </a:t>
+            </a:r>
+            <a:r>
+              <a:rPr lang="en-US" b="1" dirty="0">
+                <a:solidFill>
+                  <a:srgbClr val="FF0000"/>
+                </a:solidFill>
+              </a:rPr>
+              <a:t>DW_CCS </a:t>
+            </a:r>
+            <a:r>
+              <a:rPr lang="en-US" b="1" dirty="0"/>
+              <a:t>into Windows OS</a:t>
+            </a:r>
+          </a:p>
+          <a:p>
+            <a:pPr marL="0" lvl="1" indent="0">
+              <a:buNone/>
+              <a:tabLst>
+                <a:tab pos="460375" algn="l"/>
+              </a:tabLst>
+            </a:pPr>
+            <a:endParaRPr lang="en-US" b="1" dirty="0"/>
+          </a:p>
+          <a:p>
+            <a:pPr marL="457200" lvl="1" indent="-457200">
+              <a:buFont typeface="+mj-lt"/>
+              <a:buAutoNum type="arabicPeriod"/>
+              <a:tabLst>
+                <a:tab pos="460375" algn="l"/>
+              </a:tabLst>
+            </a:pPr>
+            <a:r>
+              <a:rPr lang="en-US" dirty="0"/>
+              <a:t>Control panel -&gt;  ODBC Data Source Administrator -&gt; Add</a:t>
+            </a:r>
+          </a:p>
+          <a:p>
+            <a:pPr marL="457200" lvl="1" indent="-457200">
+              <a:buFont typeface="+mj-lt"/>
+              <a:buAutoNum type="arabicPeriod"/>
+              <a:tabLst>
+                <a:tab pos="460375" algn="l"/>
+              </a:tabLst>
+            </a:pPr>
+            <a:r>
+              <a:rPr lang="en-US" dirty="0"/>
+              <a:t>Select “ODBC Driver 17 for SQL Server” -&gt; Finish</a:t>
+            </a:r>
+          </a:p>
+          <a:p>
+            <a:pPr marL="457200" lvl="1" indent="-457200">
+              <a:buFont typeface="+mj-lt"/>
+              <a:buAutoNum type="arabicPeriod"/>
+              <a:tabLst>
+                <a:tab pos="460375" algn="l"/>
+              </a:tabLst>
+            </a:pPr>
+            <a:r>
+              <a:rPr lang="en-US" dirty="0"/>
+              <a:t>Name: </a:t>
+            </a:r>
+            <a:r>
+              <a:rPr lang="en-US" dirty="0">
+                <a:solidFill>
+                  <a:srgbClr val="FF0000"/>
+                </a:solidFill>
+              </a:rPr>
+              <a:t>DW_CCS </a:t>
+            </a:r>
+            <a:r>
+              <a:rPr lang="en-US" dirty="0"/>
+              <a:t>-&gt; Server: DataWrangling2025 -&gt; Next</a:t>
+            </a:r>
+          </a:p>
+          <a:p>
+            <a:pPr marL="457200" lvl="1" indent="-457200">
+              <a:spcAft>
+                <a:spcPts val="600"/>
+              </a:spcAft>
+              <a:buFont typeface="+mj-lt"/>
+              <a:buAutoNum type="arabicPeriod"/>
+              <a:tabLst>
+                <a:tab pos="460375" algn="l"/>
+              </a:tabLst>
+            </a:pPr>
+            <a:r>
+              <a:rPr lang="en-US" dirty="0"/>
+              <a:t>Windows authentication -&gt; Next</a:t>
+            </a:r>
+          </a:p>
+          <a:p>
+            <a:pPr marL="457200" lvl="1" indent="-457200">
+              <a:spcAft>
+                <a:spcPts val="600"/>
+              </a:spcAft>
+              <a:buFont typeface="+mj-lt"/>
+              <a:buAutoNum type="arabicPeriod"/>
+              <a:tabLst>
+                <a:tab pos="460375" algn="l"/>
+              </a:tabLst>
+            </a:pPr>
+            <a:r>
+              <a:rPr lang="en-US" dirty="0"/>
+              <a:t>Check “Change the default database to” -&gt; select </a:t>
+            </a:r>
+            <a:r>
+              <a:rPr lang="en-US" dirty="0" err="1">
+                <a:solidFill>
+                  <a:srgbClr val="FF0000"/>
+                </a:solidFill>
+              </a:rPr>
+              <a:t>ccs_applications</a:t>
+            </a:r>
+            <a:r>
+              <a:rPr lang="en-US" dirty="0"/>
+              <a:t> -&gt; Next</a:t>
+            </a:r>
+          </a:p>
+          <a:p>
+            <a:pPr marL="457200" lvl="1" indent="-457200">
+              <a:spcAft>
+                <a:spcPts val="600"/>
+              </a:spcAft>
+              <a:buFont typeface="+mj-lt"/>
+              <a:buAutoNum type="arabicPeriod"/>
+              <a:tabLst>
+                <a:tab pos="460375" algn="l"/>
+              </a:tabLst>
+            </a:pPr>
+            <a:r>
+              <a:rPr lang="en-US" dirty="0"/>
+              <a:t>Click “Finish”</a:t>
+            </a:r>
+          </a:p>
+          <a:p>
+            <a:pPr marL="457200" lvl="1" indent="-457200">
+              <a:spcAft>
+                <a:spcPts val="600"/>
+              </a:spcAft>
+              <a:buFont typeface="+mj-lt"/>
+              <a:buAutoNum type="arabicPeriod"/>
+              <a:tabLst>
+                <a:tab pos="460375" algn="l"/>
+              </a:tabLst>
+            </a:pPr>
+            <a:r>
+              <a:rPr lang="en-US" dirty="0"/>
+              <a:t>Test data source -&gt; “Test completed successfully!” -&gt; OK -&gt; OK</a:t>
+            </a:r>
+          </a:p>
+          <a:p>
+            <a:pPr marL="0" lvl="1" indent="0">
+              <a:buNone/>
+              <a:tabLst>
+                <a:tab pos="460375" algn="l"/>
+              </a:tabLst>
+            </a:pPr>
+            <a:endParaRPr lang="en-US" dirty="0"/>
+          </a:p>
+          <a:p>
+            <a:pPr marL="457200" lvl="1" indent="-457200">
+              <a:buFont typeface="+mj-lt"/>
+              <a:buAutoNum type="arabicPeriod"/>
+              <a:tabLst>
+                <a:tab pos="460375" algn="l"/>
+              </a:tabLst>
+            </a:pPr>
+            <a:endParaRPr lang="en-US" dirty="0"/>
+          </a:p>
+          <a:p>
+            <a:pPr marL="457200" lvl="1" indent="-457200">
+              <a:buFont typeface="+mj-lt"/>
+              <a:buAutoNum type="arabicPeriod"/>
+              <a:tabLst>
+                <a:tab pos="460375" algn="l"/>
+              </a:tabLst>
+            </a:pPr>
+            <a:endParaRPr lang="en-US" dirty="0"/>
+          </a:p>
+        </p:txBody>
+      </p:sp>
+    </p:spTree>
+    <p:extLst>
+      <p:ext uri="{BB962C8B-B14F-4D97-AF65-F5344CB8AC3E}">
+        <p14:creationId xmlns:p14="http://schemas.microsoft.com/office/powerpoint/2010/main" val="3382225106"/>
+      </p:ext>
+    </p:extLst>
+  </p:cSld>
+  <p:clrMapOvr>
+    <a:masterClrMapping/>
+  </p:clrMapOvr>
+</p:sld>
+</file>
+
+<file path=ppt/slides/slide17.xml><?xml version="1.0" encoding="utf-8"?>
+<p:sld xmlns:a="http://schemas.openxmlformats.org/drawingml/2006/main" xmlns:r="http://schemas.openxmlformats.org/officeDocument/2006/relationships" xmlns:p="http://schemas.openxmlformats.org/presentationml/2006/main">
+  <p:cSld>
+    <p:spTree>
+      <p:nvGrpSpPr>
+        <p:cNvPr id="1" name=""/>
+        <p:cNvGrpSpPr/>
+        <p:nvPr/>
+      </p:nvGrpSpPr>
+      <p:grpSpPr>
+        <a:xfrm>
+          <a:off x="0" y="0"/>
+          <a:ext cx="0" cy="0"/>
+          <a:chOff x="0" y="0"/>
+          <a:chExt cx="0" cy="0"/>
+        </a:xfrm>
+      </p:grpSpPr>
+      <p:sp>
+        <p:nvSpPr>
+          <p:cNvPr id="2" name="Title 1">
+            <a:extLst>
+              <a:ext uri="{FF2B5EF4-FFF2-40B4-BE49-F238E27FC236}">
+                <a16:creationId xmlns:a16="http://schemas.microsoft.com/office/drawing/2014/main" id="{10927693-D745-3BDF-31B8-24FFC7F227CE}"/>
+              </a:ext>
+            </a:extLst>
+          </p:cNvPr>
+          <p:cNvSpPr>
+            <a:spLocks noGrp="1"/>
+          </p:cNvSpPr>
+          <p:nvPr>
+            <p:ph type="title"/>
+          </p:nvPr>
+        </p:nvSpPr>
+        <p:spPr/>
+        <p:txBody>
+          <a:bodyPr/>
+          <a:lstStyle/>
+          <a:p>
+            <a:r>
+              <a:rPr lang="en-US" dirty="0"/>
+              <a:t>Connecting to DataWrangling2025 SQL Server through R (cont.)</a:t>
+            </a:r>
+          </a:p>
+        </p:txBody>
+      </p:sp>
+      <p:sp>
+        <p:nvSpPr>
+          <p:cNvPr id="3" name="Content Placeholder 2">
+            <a:extLst>
+              <a:ext uri="{FF2B5EF4-FFF2-40B4-BE49-F238E27FC236}">
+                <a16:creationId xmlns:a16="http://schemas.microsoft.com/office/drawing/2014/main" id="{339C2077-1FB3-00F3-5B68-A32F1F4C9C39}"/>
+              </a:ext>
+            </a:extLst>
+          </p:cNvPr>
+          <p:cNvSpPr>
+            <a:spLocks noGrp="1"/>
+          </p:cNvSpPr>
+          <p:nvPr>
+            <p:ph idx="1"/>
+          </p:nvPr>
+        </p:nvSpPr>
+        <p:spPr>
+          <a:xfrm>
+            <a:off x="838200" y="1825625"/>
+            <a:ext cx="5458838" cy="4351338"/>
+          </a:xfrm>
+        </p:spPr>
+        <p:txBody>
+          <a:bodyPr/>
+          <a:lstStyle/>
+          <a:p>
+            <a:r>
+              <a:rPr lang="en-US" dirty="0"/>
+              <a:t>Run </a:t>
+            </a:r>
+            <a:r>
+              <a:rPr lang="en-US" dirty="0" err="1"/>
+              <a:t>test_sql.R</a:t>
+            </a:r>
+            <a:r>
+              <a:rPr lang="en-US" dirty="0"/>
+              <a:t> in RStudio on your laptop</a:t>
+            </a:r>
+          </a:p>
+          <a:p>
+            <a:r>
+              <a:rPr lang="en-US" dirty="0"/>
+              <a:t>See next slide for the expected output</a:t>
+            </a:r>
+          </a:p>
+          <a:p>
+            <a:r>
+              <a:rPr lang="en-US" dirty="0"/>
+              <a:t>If you do not see the expected outputs, email </a:t>
+            </a:r>
+            <a:r>
+              <a:rPr lang="en-US" dirty="0">
+                <a:hlinkClick r:id="rId3"/>
+              </a:rPr>
+              <a:t>Yichen.chen@stjude.org</a:t>
+            </a:r>
+            <a:r>
+              <a:rPr lang="en-US" dirty="0"/>
+              <a:t> with screenshot</a:t>
+            </a:r>
+          </a:p>
+          <a:p>
+            <a:endParaRPr lang="en-US" dirty="0"/>
+          </a:p>
+          <a:p>
+            <a:pPr marL="0" indent="0">
+              <a:buNone/>
+            </a:pPr>
+            <a:endParaRPr lang="en-US" dirty="0"/>
+          </a:p>
+        </p:txBody>
+      </p:sp>
+      <p:pic>
+        <p:nvPicPr>
+          <p:cNvPr id="5" name="Picture 4">
+            <a:extLst>
+              <a:ext uri="{FF2B5EF4-FFF2-40B4-BE49-F238E27FC236}">
+                <a16:creationId xmlns:a16="http://schemas.microsoft.com/office/drawing/2014/main" id="{25185061-4D27-3780-4E86-3165FA12BB49}"/>
+              </a:ext>
+            </a:extLst>
+          </p:cNvPr>
+          <p:cNvPicPr>
+            <a:picLocks noChangeAspect="1"/>
+          </p:cNvPicPr>
+          <p:nvPr/>
+        </p:nvPicPr>
+        <p:blipFill>
+          <a:blip r:embed="rId4"/>
+          <a:stretch>
+            <a:fillRect/>
+          </a:stretch>
+        </p:blipFill>
+        <p:spPr>
+          <a:xfrm>
+            <a:off x="6011662" y="2605624"/>
+            <a:ext cx="6034844" cy="1998802"/>
+          </a:xfrm>
+          <a:prstGeom prst="rect">
+            <a:avLst/>
+          </a:prstGeom>
+        </p:spPr>
+      </p:pic>
+    </p:spTree>
+    <p:extLst>
+      <p:ext uri="{BB962C8B-B14F-4D97-AF65-F5344CB8AC3E}">
+        <p14:creationId xmlns:p14="http://schemas.microsoft.com/office/powerpoint/2010/main" val="4066761548"/>
+      </p:ext>
+    </p:extLst>
+  </p:cSld>
+  <p:clrMapOvr>
+    <a:masterClrMapping/>
+  </p:clrMapOvr>
+</p:sld>
+</file>
+
+<file path=ppt/slides/slide18.xml><?xml version="1.0" encoding="utf-8"?>
+<p:sld xmlns:a="http://schemas.openxmlformats.org/drawingml/2006/main" xmlns:r="http://schemas.openxmlformats.org/officeDocument/2006/relationships" xmlns:p="http://schemas.openxmlformats.org/presentationml/2006/main">
+  <p:cSld>
+    <p:spTree>
+      <p:nvGrpSpPr>
+        <p:cNvPr id="1" name=""/>
+        <p:cNvGrpSpPr/>
+        <p:nvPr/>
+      </p:nvGrpSpPr>
+      <p:grpSpPr>
+        <a:xfrm>
+          <a:off x="0" y="0"/>
+          <a:ext cx="0" cy="0"/>
+          <a:chOff x="0" y="0"/>
+          <a:chExt cx="0" cy="0"/>
+        </a:xfrm>
+      </p:grpSpPr>
+      <p:sp>
+        <p:nvSpPr>
+          <p:cNvPr id="2" name="Title 1">
+            <a:extLst>
+              <a:ext uri="{FF2B5EF4-FFF2-40B4-BE49-F238E27FC236}">
+                <a16:creationId xmlns:a16="http://schemas.microsoft.com/office/drawing/2014/main" id="{8D11D081-7BE2-42A5-C702-0BCAA09C178D}"/>
+              </a:ext>
+            </a:extLst>
+          </p:cNvPr>
+          <p:cNvSpPr>
+            <a:spLocks noGrp="1"/>
+          </p:cNvSpPr>
+          <p:nvPr>
+            <p:ph type="title"/>
+          </p:nvPr>
+        </p:nvSpPr>
+        <p:spPr/>
+        <p:txBody>
+          <a:bodyPr/>
+          <a:lstStyle/>
+          <a:p>
+            <a:r>
+              <a:rPr lang="en-US" dirty="0"/>
+              <a:t>Connecting to DataWrangling2025 SQL Server through R (cont.)</a:t>
+            </a:r>
+          </a:p>
+        </p:txBody>
+      </p:sp>
+      <p:sp>
+        <p:nvSpPr>
+          <p:cNvPr id="3" name="Content Placeholder 2">
+            <a:extLst>
+              <a:ext uri="{FF2B5EF4-FFF2-40B4-BE49-F238E27FC236}">
+                <a16:creationId xmlns:a16="http://schemas.microsoft.com/office/drawing/2014/main" id="{00EE931D-4331-A9AC-C48A-852E5967BEE4}"/>
+              </a:ext>
+            </a:extLst>
+          </p:cNvPr>
+          <p:cNvSpPr>
+            <a:spLocks noGrp="1"/>
+          </p:cNvSpPr>
+          <p:nvPr>
+            <p:ph idx="1"/>
+          </p:nvPr>
+        </p:nvSpPr>
+        <p:spPr/>
+        <p:txBody>
+          <a:bodyPr/>
+          <a:lstStyle/>
+          <a:p>
+            <a:r>
+              <a:rPr lang="en-US" dirty="0"/>
+              <a:t>Expected output from </a:t>
+            </a:r>
+            <a:r>
+              <a:rPr lang="en-US" dirty="0" err="1"/>
+              <a:t>test_sql.R</a:t>
+            </a:r>
+            <a:endParaRPr lang="en-US" dirty="0"/>
+          </a:p>
+          <a:p>
+            <a:endParaRPr lang="en-US" dirty="0"/>
+          </a:p>
+          <a:p>
+            <a:endParaRPr lang="en-US" dirty="0"/>
+          </a:p>
+        </p:txBody>
+      </p:sp>
+      <p:pic>
+        <p:nvPicPr>
+          <p:cNvPr id="8" name="Picture 7">
+            <a:extLst>
+              <a:ext uri="{FF2B5EF4-FFF2-40B4-BE49-F238E27FC236}">
+                <a16:creationId xmlns:a16="http://schemas.microsoft.com/office/drawing/2014/main" id="{9760AB8A-0B3C-B8DB-0CD0-B3CD1C11D836}"/>
+              </a:ext>
+            </a:extLst>
+          </p:cNvPr>
+          <p:cNvPicPr>
+            <a:picLocks noChangeAspect="1"/>
+          </p:cNvPicPr>
+          <p:nvPr/>
+        </p:nvPicPr>
+        <p:blipFill>
+          <a:blip r:embed="rId2"/>
+          <a:stretch>
+            <a:fillRect/>
+          </a:stretch>
+        </p:blipFill>
+        <p:spPr>
+          <a:xfrm>
+            <a:off x="2848831" y="2435195"/>
+            <a:ext cx="6494337" cy="4157044"/>
+          </a:xfrm>
+          <a:prstGeom prst="rect">
+            <a:avLst/>
+          </a:prstGeom>
+        </p:spPr>
+      </p:pic>
+    </p:spTree>
+    <p:extLst>
+      <p:ext uri="{BB962C8B-B14F-4D97-AF65-F5344CB8AC3E}">
+        <p14:creationId xmlns:p14="http://schemas.microsoft.com/office/powerpoint/2010/main" val="3156994839"/>
       </p:ext>
     </p:extLst>
   </p:cSld>
@@ -4150,13 +6568,68 @@
           <a:p>
             <a:r>
               <a:rPr lang="en-US" dirty="0"/>
-              <a:t>Connecting to DataWrangling2025 SQL Server through R</a:t>
-            </a:r>
+              <a:t>Repository </a:t>
+            </a:r>
+            <a:r>
+              <a:rPr lang="en-US" dirty="0" err="1"/>
+              <a:t>DataWrangling_R</a:t>
+            </a:r>
+            <a:r>
+              <a:rPr lang="en-US" dirty="0"/>
+              <a:t> in St. Jude MS ABDS, </a:t>
+            </a:r>
+            <a:r>
+              <a:rPr lang="en-US" dirty="0" err="1"/>
+              <a:t>Github</a:t>
+            </a:r>
+            <a:endParaRPr lang="en-US" dirty="0"/>
           </a:p>
           <a:p>
             <a:r>
               <a:rPr lang="en-US" dirty="0"/>
               <a:t>Connecting to DataWrangling2025 SQL Server through SAS Server</a:t>
+            </a:r>
+          </a:p>
+          <a:p>
+            <a:pPr lvl="1"/>
+            <a:r>
+              <a:rPr lang="en-US" dirty="0"/>
+              <a:t>Using data source name (DSN)</a:t>
+            </a:r>
+          </a:p>
+          <a:p>
+            <a:pPr lvl="1"/>
+            <a:r>
+              <a:rPr lang="en-US" dirty="0"/>
+              <a:t>Using proc </a:t>
+            </a:r>
+            <a:r>
+              <a:rPr lang="en-US" dirty="0" err="1"/>
+              <a:t>sql</a:t>
+            </a:r>
+            <a:r>
+              <a:rPr lang="en-US" dirty="0"/>
+              <a:t>  </a:t>
+            </a:r>
+          </a:p>
+          <a:p>
+            <a:r>
+              <a:rPr lang="en-US" dirty="0"/>
+              <a:t>Connecting to DataWrangling2025 SQL Server through R</a:t>
+            </a:r>
+          </a:p>
+          <a:p>
+            <a:pPr lvl="1"/>
+            <a:r>
+              <a:rPr lang="en-US" dirty="0"/>
+              <a:t>Adding DSN into Windows OS</a:t>
+            </a:r>
+          </a:p>
+          <a:p>
+            <a:pPr lvl="1"/>
+            <a:r>
+              <a:rPr lang="en-US" dirty="0"/>
+              <a:t>Using DSN</a:t>
             </a:r>
           </a:p>
         </p:txBody>
@@ -4570,7 +7043,13 @@
   <p:cSld>
     <p:spTree>
       <p:nvGrpSpPr>
-        <p:cNvPr id="1" name=""/>
+        <p:cNvPr id="1" name="">
+          <a:extLst>
+            <a:ext uri="{FF2B5EF4-FFF2-40B4-BE49-F238E27FC236}">
+              <a16:creationId xmlns:a16="http://schemas.microsoft.com/office/drawing/2014/main" id="{F9825BB3-5B63-C64A-69B1-AA89CD122CAF}"/>
+            </a:ext>
+          </a:extLst>
+        </p:cNvPr>
         <p:cNvGrpSpPr/>
         <p:nvPr/>
       </p:nvGrpSpPr>
@@ -4587,7 +7066,7 @@
           <p:cNvPr id="2" name="Title 1">
             <a:extLst>
               <a:ext uri="{FF2B5EF4-FFF2-40B4-BE49-F238E27FC236}">
-                <a16:creationId xmlns:a16="http://schemas.microsoft.com/office/drawing/2014/main" id="{9005885A-FB06-682C-A595-C529D5AD01DF}"/>
+                <a16:creationId xmlns:a16="http://schemas.microsoft.com/office/drawing/2014/main" id="{ABE7FD9A-8C31-A640-A046-9686547AA35F}"/>
               </a:ext>
             </a:extLst>
           </p:cNvPr>
@@ -4605,8 +7084,21 @@
           <a:p>
             <a:r>
               <a:rPr lang="en-US" dirty="0"/>
-              <a:t>Connecting to DataWrangling2025 SQL Server through R</a:t>
-            </a:r>
+              <a:t>Repository </a:t>
+            </a:r>
+            <a:r>
+              <a:rPr lang="en-US" dirty="0" err="1"/>
+              <a:t>DataWrangling_R</a:t>
+            </a:r>
+            <a:r>
+              <a:rPr lang="en-US" dirty="0"/>
+              <a:t> in St. Jude MS ABDS, </a:t>
+            </a:r>
+            <a:r>
+              <a:rPr lang="en-US" dirty="0" err="1"/>
+              <a:t>Github</a:t>
+            </a:r>
+            <a:endParaRPr lang="en-US" dirty="0"/>
           </a:p>
         </p:txBody>
       </p:sp>
@@ -4615,7 +7107,7 @@
           <p:cNvPr id="3" name="Content Placeholder 2">
             <a:extLst>
               <a:ext uri="{FF2B5EF4-FFF2-40B4-BE49-F238E27FC236}">
-                <a16:creationId xmlns:a16="http://schemas.microsoft.com/office/drawing/2014/main" id="{1720BC75-A8D6-26AE-7756-384122A6BCD1}"/>
+                <a16:creationId xmlns:a16="http://schemas.microsoft.com/office/drawing/2014/main" id="{04714D8C-A90A-BB15-0714-11EA73B71B4C}"/>
               </a:ext>
             </a:extLst>
           </p:cNvPr>
@@ -4665,7 +7157,7 @@
           <p:cNvPr id="7" name="Picture 6">
             <a:extLst>
               <a:ext uri="{FF2B5EF4-FFF2-40B4-BE49-F238E27FC236}">
-                <a16:creationId xmlns:a16="http://schemas.microsoft.com/office/drawing/2014/main" id="{B125B29B-F9BF-4311-FDC7-860295496B0D}"/>
+                <a16:creationId xmlns:a16="http://schemas.microsoft.com/office/drawing/2014/main" id="{8E5211B2-9C1E-EECA-86ED-16F504FAD7EF}"/>
               </a:ext>
             </a:extLst>
           </p:cNvPr>
@@ -4695,7 +7187,7 @@
           <p:cNvPr id="5" name="Picture 4">
             <a:extLst>
               <a:ext uri="{FF2B5EF4-FFF2-40B4-BE49-F238E27FC236}">
-                <a16:creationId xmlns:a16="http://schemas.microsoft.com/office/drawing/2014/main" id="{88DDE662-7DC9-F20E-B3CA-4FA6A8A48DD1}"/>
+                <a16:creationId xmlns:a16="http://schemas.microsoft.com/office/drawing/2014/main" id="{739F46F4-D073-1294-B460-E3495BC1B0A4}"/>
               </a:ext>
             </a:extLst>
           </p:cNvPr>
@@ -4723,7 +7215,7 @@
     </p:spTree>
     <p:extLst>
       <p:ext uri="{BB962C8B-B14F-4D97-AF65-F5344CB8AC3E}">
-        <p14:creationId xmlns:p14="http://schemas.microsoft.com/office/powerpoint/2010/main" val="1263987258"/>
+        <p14:creationId xmlns:p14="http://schemas.microsoft.com/office/powerpoint/2010/main" val="2839645707"/>
       </p:ext>
     </p:extLst>
   </p:cSld>
@@ -4738,7 +7230,13 @@
   <p:cSld>
     <p:spTree>
       <p:nvGrpSpPr>
-        <p:cNvPr id="1" name=""/>
+        <p:cNvPr id="1" name="">
+          <a:extLst>
+            <a:ext uri="{FF2B5EF4-FFF2-40B4-BE49-F238E27FC236}">
+              <a16:creationId xmlns:a16="http://schemas.microsoft.com/office/drawing/2014/main" id="{AE615FE5-E8BE-3F95-1F43-3E193F4F93EC}"/>
+            </a:ext>
+          </a:extLst>
+        </p:cNvPr>
         <p:cNvGrpSpPr/>
         <p:nvPr/>
       </p:nvGrpSpPr>
@@ -4755,7 +7253,7 @@
           <p:cNvPr id="2" name="Title 1">
             <a:extLst>
               <a:ext uri="{FF2B5EF4-FFF2-40B4-BE49-F238E27FC236}">
-                <a16:creationId xmlns:a16="http://schemas.microsoft.com/office/drawing/2014/main" id="{10927693-D745-3BDF-31B8-24FFC7F227CE}"/>
+                <a16:creationId xmlns:a16="http://schemas.microsoft.com/office/drawing/2014/main" id="{76713FEC-397D-FD4B-A53F-455B271D0633}"/>
               </a:ext>
             </a:extLst>
           </p:cNvPr>
@@ -4773,7 +7271,7 @@
           <a:p>
             <a:r>
               <a:rPr lang="en-US" dirty="0"/>
-              <a:t>Connecting to DataWrangling2025 SQL Server through R (cont.)</a:t>
+              <a:t>Connecting to DataWrangling2025 SQL Server through SAS Server</a:t>
             </a:r>
           </a:p>
         </p:txBody>
@@ -4783,7 +7281,7 @@
           <p:cNvPr id="3" name="Content Placeholder 2">
             <a:extLst>
               <a:ext uri="{FF2B5EF4-FFF2-40B4-BE49-F238E27FC236}">
-                <a16:creationId xmlns:a16="http://schemas.microsoft.com/office/drawing/2014/main" id="{339C2077-1FB3-00F3-5B68-A32F1F4C9C39}"/>
+                <a16:creationId xmlns:a16="http://schemas.microsoft.com/office/drawing/2014/main" id="{BCB98F0A-3DA1-1B34-0266-D74AE1C09A2E}"/>
               </a:ext>
             </a:extLst>
           </p:cNvPr>
@@ -4801,8 +7299,19 @@
           </a:xfrm>
         </p:spPr>
         <p:txBody>
-          <a:bodyPr/>
-          <a:lstStyle/>
+          <a:bodyPr>
+            <a:normAutofit/>
+          </a:bodyPr>
+          <a:lstStyle/>
+          <a:p>
+            <a:pPr marL="0" indent="0">
+              <a:buNone/>
+            </a:pPr>
+            <a:r>
+              <a:rPr lang="en-US" b="1" dirty="0"/>
+              <a:t>Using data source name (DSN)</a:t>
+            </a:r>
+          </a:p>
           <a:p>
             <a:r>
               <a:rPr lang="en-US" dirty="0"/>
@@ -4810,11 +7319,11 @@
             </a:r>
             <a:r>
               <a:rPr lang="en-US" dirty="0" err="1"/>
-              <a:t>test_sql.R</a:t>
+              <a:t>test_sql.sas</a:t>
             </a:r>
             <a:r>
               <a:rPr lang="en-US" dirty="0"/>
-              <a:t> in RStudio on your laptop</a:t>
+              <a:t> (lines 13-15) in SAS Studio</a:t>
             </a:r>
           </a:p>
           <a:p>
@@ -4852,10 +7361,10 @@
       </p:sp>
       <p:pic>
         <p:nvPicPr>
-          <p:cNvPr id="7" name="Picture 6">
-            <a:extLst>
-              <a:ext uri="{FF2B5EF4-FFF2-40B4-BE49-F238E27FC236}">
-                <a16:creationId xmlns:a16="http://schemas.microsoft.com/office/drawing/2014/main" id="{2C73FC53-847B-E091-0DDA-FB4973D2D0C3}"/>
+          <p:cNvPr id="5" name="Picture 4">
+            <a:extLst>
+              <a:ext uri="{FF2B5EF4-FFF2-40B4-BE49-F238E27FC236}">
+                <a16:creationId xmlns:a16="http://schemas.microsoft.com/office/drawing/2014/main" id="{CCD5DB46-F544-B1CE-950D-6021F3FA5F72}"/>
               </a:ext>
             </a:extLst>
           </p:cNvPr>
@@ -4872,8 +7381,8 @@
         </p:blipFill>
         <p:spPr>
           <a:xfrm>
-            <a:off x="5939078" y="1935047"/>
-            <a:ext cx="5774301" cy="3091504"/>
+            <a:off x="6297038" y="3053181"/>
+            <a:ext cx="5792008" cy="1257475"/>
           </a:xfrm>
           <a:prstGeom prst="rect">
             <a:avLst/>
@@ -4883,7 +7392,7 @@
     </p:spTree>
     <p:extLst>
       <p:ext uri="{BB962C8B-B14F-4D97-AF65-F5344CB8AC3E}">
-        <p14:creationId xmlns:p14="http://schemas.microsoft.com/office/powerpoint/2010/main" val="4066761548"/>
+        <p14:creationId xmlns:p14="http://schemas.microsoft.com/office/powerpoint/2010/main" val="2824653451"/>
       </p:ext>
     </p:extLst>
   </p:cSld>
@@ -4915,7 +7424,7 @@
           <p:cNvPr id="2" name="Title 1">
             <a:extLst>
               <a:ext uri="{FF2B5EF4-FFF2-40B4-BE49-F238E27FC236}">
-                <a16:creationId xmlns:a16="http://schemas.microsoft.com/office/drawing/2014/main" id="{8D11D081-7BE2-42A5-C702-0BCAA09C178D}"/>
+                <a16:creationId xmlns:a16="http://schemas.microsoft.com/office/drawing/2014/main" id="{2E026C02-9456-53C2-4AAD-3B57C20C3C65}"/>
               </a:ext>
             </a:extLst>
           </p:cNvPr>
@@ -4933,7 +7442,7 @@
           <a:p>
             <a:r>
               <a:rPr lang="en-US" dirty="0"/>
-              <a:t>Connecting to DataWrangling2025 SQL Server through R (cont.)</a:t>
+              <a:t>Connecting to DataWrangling2025 SQL Server through SAS Server (cont.)</a:t>
             </a:r>
           </a:p>
         </p:txBody>
@@ -4943,7 +7452,7 @@
           <p:cNvPr id="3" name="Content Placeholder 2">
             <a:extLst>
               <a:ext uri="{FF2B5EF4-FFF2-40B4-BE49-F238E27FC236}">
-                <a16:creationId xmlns:a16="http://schemas.microsoft.com/office/drawing/2014/main" id="{00EE931D-4331-A9AC-C48A-852E5967BEE4}"/>
+                <a16:creationId xmlns:a16="http://schemas.microsoft.com/office/drawing/2014/main" id="{07450B49-6BF5-5612-32D5-91EC0AB85680}"/>
               </a:ext>
             </a:extLst>
           </p:cNvPr>
@@ -4961,13 +7470,8 @@
           <a:p>
             <a:r>
               <a:rPr lang="en-US" dirty="0"/>
-              <a:t>Expected output from </a:t>
-            </a:r>
-            <a:r>
-              <a:rPr lang="en-US" dirty="0" err="1"/>
-              <a:t>test_sql.R</a:t>
-            </a:r>
-            <a:endParaRPr lang="en-US" dirty="0"/>
+              <a:t>Expected output from method 1 - DSN</a:t>
+            </a:r>
           </a:p>
           <a:p>
             <a:endParaRPr lang="en-US" dirty="0"/>
@@ -4982,7 +7486,7 @@
           <p:cNvPr id="5" name="Picture 4">
             <a:extLst>
               <a:ext uri="{FF2B5EF4-FFF2-40B4-BE49-F238E27FC236}">
-                <a16:creationId xmlns:a16="http://schemas.microsoft.com/office/drawing/2014/main" id="{14E5C312-6E50-8E8E-5CE6-B2C368C4AB16}"/>
+                <a16:creationId xmlns:a16="http://schemas.microsoft.com/office/drawing/2014/main" id="{2B12CF7A-1E0F-4B49-7473-4910704DA75C}"/>
               </a:ext>
             </a:extLst>
           </p:cNvPr>
@@ -4999,8 +7503,38 @@
         </p:blipFill>
         <p:spPr>
           <a:xfrm>
-            <a:off x="3068058" y="2549000"/>
-            <a:ext cx="5887272" cy="3762900"/>
+            <a:off x="641605" y="2683594"/>
+            <a:ext cx="5095580" cy="3445095"/>
+          </a:xfrm>
+          <a:prstGeom prst="rect">
+            <a:avLst/>
+          </a:prstGeom>
+        </p:spPr>
+      </p:pic>
+      <p:pic>
+        <p:nvPicPr>
+          <p:cNvPr id="8" name="Picture 7">
+            <a:extLst>
+              <a:ext uri="{FF2B5EF4-FFF2-40B4-BE49-F238E27FC236}">
+                <a16:creationId xmlns:a16="http://schemas.microsoft.com/office/drawing/2014/main" id="{32F490B2-5805-E843-A846-B6F2B89465EE}"/>
+              </a:ext>
+            </a:extLst>
+          </p:cNvPr>
+          <p:cNvPicPr>
+            <a:picLocks noChangeAspect="1"/>
+          </p:cNvPicPr>
+          <p:nvPr/>
+        </p:nvPicPr>
+        <p:blipFill>
+          <a:blip r:embed="rId3"/>
+          <a:stretch>
+            <a:fillRect/>
+          </a:stretch>
+        </p:blipFill>
+        <p:spPr>
+          <a:xfrm>
+            <a:off x="6251641" y="2683595"/>
+            <a:ext cx="5616615" cy="3429000"/>
           </a:xfrm>
           <a:prstGeom prst="rect">
             <a:avLst/>
@@ -5010,7 +7544,7 @@
     </p:spTree>
     <p:extLst>
       <p:ext uri="{BB962C8B-B14F-4D97-AF65-F5344CB8AC3E}">
-        <p14:creationId xmlns:p14="http://schemas.microsoft.com/office/powerpoint/2010/main" val="3156994839"/>
+        <p14:creationId xmlns:p14="http://schemas.microsoft.com/office/powerpoint/2010/main" val="2252906759"/>
       </p:ext>
     </p:extLst>
   </p:cSld>
@@ -5028,7 +7562,7 @@
         <p:cNvPr id="1" name="">
           <a:extLst>
             <a:ext uri="{FF2B5EF4-FFF2-40B4-BE49-F238E27FC236}">
-              <a16:creationId xmlns:a16="http://schemas.microsoft.com/office/drawing/2014/main" id="{AE615FE5-E8BE-3F95-1F43-3E193F4F93EC}"/>
+              <a16:creationId xmlns:a16="http://schemas.microsoft.com/office/drawing/2014/main" id="{099E537E-A796-B785-204B-6FC35C35BD71}"/>
             </a:ext>
           </a:extLst>
         </p:cNvPr>
@@ -5048,7 +7582,7 @@
           <p:cNvPr id="2" name="Title 1">
             <a:extLst>
               <a:ext uri="{FF2B5EF4-FFF2-40B4-BE49-F238E27FC236}">
-                <a16:creationId xmlns:a16="http://schemas.microsoft.com/office/drawing/2014/main" id="{76713FEC-397D-FD4B-A53F-455B271D0633}"/>
+                <a16:creationId xmlns:a16="http://schemas.microsoft.com/office/drawing/2014/main" id="{AFA8BCB4-E432-3E7C-B0B9-D2BA4B055077}"/>
               </a:ext>
             </a:extLst>
           </p:cNvPr>
@@ -5066,7 +7600,7 @@
           <a:p>
             <a:r>
               <a:rPr lang="en-US" dirty="0"/>
-              <a:t>Connecting to DataWrangling2025 SQL Server through SAS Server</a:t>
+              <a:t>Connecting to DataWrangling2025 SQL Server through SAS Server (cont.)</a:t>
             </a:r>
           </a:p>
         </p:txBody>
@@ -5076,7 +7610,7 @@
           <p:cNvPr id="3" name="Content Placeholder 2">
             <a:extLst>
               <a:ext uri="{FF2B5EF4-FFF2-40B4-BE49-F238E27FC236}">
-                <a16:creationId xmlns:a16="http://schemas.microsoft.com/office/drawing/2014/main" id="{BCB98F0A-3DA1-1B34-0266-D74AE1C09A2E}"/>
+                <a16:creationId xmlns:a16="http://schemas.microsoft.com/office/drawing/2014/main" id="{7F3AE4DB-035A-3749-77C9-561C2A4B5D1A}"/>
               </a:ext>
             </a:extLst>
           </p:cNvPr>
@@ -5094,8 +7628,24 @@
           </a:xfrm>
         </p:spPr>
         <p:txBody>
-          <a:bodyPr/>
-          <a:lstStyle/>
+          <a:bodyPr>
+            <a:normAutofit/>
+          </a:bodyPr>
+          <a:lstStyle/>
+          <a:p>
+            <a:pPr marL="0" indent="0">
+              <a:buNone/>
+            </a:pPr>
+            <a:r>
+              <a:rPr lang="en-US" b="1" dirty="0"/>
+              <a:t>Using proc </a:t>
+            </a:r>
+            <a:r>
+              <a:rPr lang="en-US" b="1" dirty="0" err="1"/>
+              <a:t>sql</a:t>
+            </a:r>
+            <a:endParaRPr lang="en-US" b="1" dirty="0"/>
+          </a:p>
           <a:p>
             <a:r>
               <a:rPr lang="en-US" dirty="0"/>
@@ -5107,7 +7657,7 @@
             </a:r>
             <a:r>
               <a:rPr lang="en-US" dirty="0"/>
-              <a:t> in SAS Studio</a:t>
+              <a:t> (lines 19-28) in SAS Studio</a:t>
             </a:r>
           </a:p>
           <a:p>
@@ -5145,10 +7695,10 @@
       </p:sp>
       <p:pic>
         <p:nvPicPr>
-          <p:cNvPr id="8" name="Picture 7">
-            <a:extLst>
-              <a:ext uri="{FF2B5EF4-FFF2-40B4-BE49-F238E27FC236}">
-                <a16:creationId xmlns:a16="http://schemas.microsoft.com/office/drawing/2014/main" id="{DFB7EC7B-D98D-1792-085E-B7012831A0B6}"/>
+          <p:cNvPr id="6" name="Picture 5">
+            <a:extLst>
+              <a:ext uri="{FF2B5EF4-FFF2-40B4-BE49-F238E27FC236}">
+                <a16:creationId xmlns:a16="http://schemas.microsoft.com/office/drawing/2014/main" id="{232D671F-1BF7-2FE2-96EC-9F3BBBE70B10}"/>
               </a:ext>
             </a:extLst>
           </p:cNvPr>
@@ -5165,8 +7715,8 @@
         </p:blipFill>
         <p:spPr>
           <a:xfrm>
-            <a:off x="5945375" y="2450935"/>
-            <a:ext cx="6162528" cy="2254444"/>
+            <a:off x="6096000" y="2875619"/>
+            <a:ext cx="6004858" cy="2150339"/>
           </a:xfrm>
           <a:prstGeom prst="rect">
             <a:avLst/>
@@ -5176,7 +7726,7 @@
     </p:spTree>
     <p:extLst>
       <p:ext uri="{BB962C8B-B14F-4D97-AF65-F5344CB8AC3E}">
-        <p14:creationId xmlns:p14="http://schemas.microsoft.com/office/powerpoint/2010/main" val="1727206389"/>
+        <p14:creationId xmlns:p14="http://schemas.microsoft.com/office/powerpoint/2010/main" val="1092146382"/>
       </p:ext>
     </p:extLst>
   </p:cSld>

</xml_diff>